<commit_message>
ppt to md plain text
</commit_message>
<xml_diff>
--- a/md_ppt/test_results/test.pptx
+++ b/md_ppt/test_results/test.pptx
@@ -4,15 +4,15 @@
   <p:sldMasterIdLst>
     <p:sldMasterId id="2147483648" r:id="rId1"/>
   </p:sldMasterIdLst>
-  <p:sldIdLst>
-    <p:sldId id="256" r:id="rId2"/>
-    <p:sldId id="257" r:id="rId3"/>
-    <p:sldId id="258" r:id="rId4"/>
-  </p:sldIdLst>
   <p:notesMasterIdLst>
     <p:notesMasterId r:id="rId5"/>
   </p:notesMasterIdLst>
-  <p:sldSz cx="9144000" cy="5143500"/>
+  <p:sldIdLst>
+    <p:sldId id="259" r:id="rId2"/>
+    <p:sldId id="260" r:id="rId3"/>
+    <p:sldId id="261" r:id="rId4"/>
+  </p:sldIdLst>
+  <p:sldSz cx="9144000" cy="5143500" type="screen16x9"/>
   <p:notesSz cx="5143500" cy="9144000"/>
   <p:defaultTextStyle>
     <a:lvl1pPr marL="0" algn="l" defTabSz="914400" rtl="0" eaLnBrk="1" latinLnBrk="0" hangingPunct="1">
@@ -106,6 +106,11 @@
       </a:defRPr>
     </a:lvl9pPr>
   </p:defaultTextStyle>
+  <p:extLst>
+    <p:ext uri="{EFAFB233-063F-42B5-8137-9DF3F51BA10A}">
+      <p15:sldGuideLst xmlns:p15="http://schemas.microsoft.com/office/powerpoint/2012/main"/>
+    </p:ext>
+  </p:extLst>
 </p:presentation>
 </file>
 
@@ -131,234 +136,10 @@
           <a:chExt cx="0" cy="0"/>
         </a:xfrm>
       </p:grpSpPr>
-      <p:sp>
-        <p:nvSpPr>
-          <p:cNvPr id="2" name="Header Placeholder 1"/>
-          <p:cNvSpPr>
-            <a:spLocks noGrp="1"/>
-          </p:cNvSpPr>
-          <p:nvPr>
-            <p:ph type="hdr" sz="quarter"/>
-          </p:nvPr>
-        </p:nvSpPr>
-        <p:spPr>
-          <a:xfrm>
-            <a:off x="0" y="0"/>
-            <a:ext cx="2971800" cy="458788"/>
-          </a:xfrm>
-          <a:prstGeom prst="rect">
-            <a:avLst/>
-          </a:prstGeom>
-        </p:spPr>
-        <p:txBody>
-          <a:bodyPr vert="horz" lIns="91440" tIns="45720" rIns="91440" bIns="45720" rtlCol="0"/>
-          <a:lstStyle>
-            <a:lvl1pPr algn="l">
-              <a:defRPr sz="1200"/>
-            </a:lvl1pPr>
-          </a:lstStyle>
-          <a:p>
-            <a:endParaRPr lang="en-US"/>
-          </a:p>
-        </p:txBody>
-      </p:sp>
-      <p:sp>
-        <p:nvSpPr>
-          <p:cNvPr id="3" name="Date Placeholder 2"/>
-          <p:cNvSpPr>
-            <a:spLocks noGrp="1"/>
-          </p:cNvSpPr>
-          <p:nvPr>
-            <p:ph type="dt" idx="1"/>
-          </p:nvPr>
-        </p:nvSpPr>
-        <p:spPr>
-          <a:xfrm>
-            <a:off x="3884613" y="0"/>
-            <a:ext cx="2971800" cy="458788"/>
-          </a:xfrm>
-          <a:prstGeom prst="rect">
-            <a:avLst/>
-          </a:prstGeom>
-        </p:spPr>
-        <p:txBody>
-          <a:bodyPr vert="horz" lIns="91440" tIns="45720" rIns="91440" bIns="45720" rtlCol="0"/>
-          <a:lstStyle>
-            <a:lvl1pPr algn="r">
-              <a:defRPr sz="1200"/>
-            </a:lvl1pPr>
-          </a:lstStyle>
-          <a:p>
-            <a:fld id="{5282F153-3F37-0F45-9E97-73ACFA13230C}" type="datetimeFigureOut">
-              <a:rPr lang="en-US"/>
-              <a:t>7/23/19</a:t>
-            </a:fld>
-            <a:endParaRPr lang="en-US"/>
-          </a:p>
-        </p:txBody>
-      </p:sp>
-      <p:sp>
-        <p:nvSpPr>
-          <p:cNvPr id="4" name="Slide Image Placeholder 3"/>
-          <p:cNvSpPr>
-            <a:spLocks noGrp="1" noRot="1" noChangeAspect="1"/>
-          </p:cNvSpPr>
-          <p:nvPr>
-            <p:ph type="sldImg" idx="2"/>
-          </p:nvPr>
-        </p:nvSpPr>
-        <p:spPr>
-          <a:xfrm>
-            <a:off x="685800" y="1143000"/>
-            <a:ext cx="5486400" cy="3086100"/>
-          </a:xfrm>
-          <a:prstGeom prst="rect">
-            <a:avLst/>
-          </a:prstGeom>
-          <a:noFill/>
-          <a:ln w="12700">
-            <a:solidFill>
-              <a:prstClr val="black"/>
-            </a:solidFill>
-          </a:ln>
-        </p:spPr>
-        <p:txBody>
-          <a:bodyPr vert="horz" lIns="91440" tIns="45720" rIns="91440" bIns="45720" rtlCol="0" anchor="ctr"/>
-          <a:lstStyle/>
-          <a:p>
-            <a:endParaRPr lang="en-US"/>
-          </a:p>
-        </p:txBody>
-      </p:sp>
-      <p:sp>
-        <p:nvSpPr>
-          <p:cNvPr id="5" name="Notes Placeholder 4"/>
-          <p:cNvSpPr>
-            <a:spLocks noGrp="1"/>
-          </p:cNvSpPr>
-          <p:nvPr>
-            <p:ph type="body" sz="quarter" idx="3"/>
-          </p:nvPr>
-        </p:nvSpPr>
-        <p:spPr>
-          <a:xfrm>
-            <a:off x="685800" y="4400550"/>
-            <a:ext cx="5486400" cy="3600450"/>
-          </a:xfrm>
-          <a:prstGeom prst="rect">
-            <a:avLst/>
-          </a:prstGeom>
-        </p:spPr>
-        <p:txBody>
-          <a:bodyPr vert="horz" lIns="91440" tIns="45720" rIns="91440" bIns="45720" rtlCol="0"/>
-          <a:lstStyle/>
-          <a:p>
-            <a:pPr lvl="0"/>
-            <a:r>
-              <a:rPr lang="en-US"/>
-              <a:t>Click to edit Master text styles</a:t>
-            </a:r>
-          </a:p>
-          <a:p>
-            <a:pPr lvl="1"/>
-            <a:r>
-              <a:rPr lang="en-US"/>
-              <a:t>Second level</a:t>
-            </a:r>
-          </a:p>
-          <a:p>
-            <a:pPr lvl="2"/>
-            <a:r>
-              <a:rPr lang="en-US"/>
-              <a:t>Third level</a:t>
-            </a:r>
-          </a:p>
-          <a:p>
-            <a:pPr lvl="3"/>
-            <a:r>
-              <a:rPr lang="en-US"/>
-              <a:t>Fourth level</a:t>
-            </a:r>
-          </a:p>
-          <a:p>
-            <a:pPr lvl="4"/>
-            <a:r>
-              <a:rPr lang="en-US"/>
-              <a:t>Fifth level</a:t>
-            </a:r>
-          </a:p>
-        </p:txBody>
-      </p:sp>
-      <p:sp>
-        <p:nvSpPr>
-          <p:cNvPr id="6" name="Footer Placeholder 5"/>
-          <p:cNvSpPr>
-            <a:spLocks noGrp="1"/>
-          </p:cNvSpPr>
-          <p:nvPr>
-            <p:ph type="ftr" sz="quarter" idx="4"/>
-          </p:nvPr>
-        </p:nvSpPr>
-        <p:spPr>
-          <a:xfrm>
-            <a:off x="0" y="8685213"/>
-            <a:ext cx="2971800" cy="458787"/>
-          </a:xfrm>
-          <a:prstGeom prst="rect">
-            <a:avLst/>
-          </a:prstGeom>
-        </p:spPr>
-        <p:txBody>
-          <a:bodyPr vert="horz" lIns="91440" tIns="45720" rIns="91440" bIns="45720" rtlCol="0" anchor="b"/>
-          <a:lstStyle>
-            <a:lvl1pPr algn="l">
-              <a:defRPr sz="1200"/>
-            </a:lvl1pPr>
-          </a:lstStyle>
-          <a:p>
-            <a:endParaRPr lang="en-US"/>
-          </a:p>
-        </p:txBody>
-      </p:sp>
-      <p:sp>
-        <p:nvSpPr>
-          <p:cNvPr id="7" name="Slide Number Placeholder 6"/>
-          <p:cNvSpPr>
-            <a:spLocks noGrp="1"/>
-          </p:cNvSpPr>
-          <p:nvPr>
-            <p:ph type="sldNum" sz="quarter" idx="5"/>
-          </p:nvPr>
-        </p:nvSpPr>
-        <p:spPr>
-          <a:xfrm>
-            <a:off x="3884613" y="8685213"/>
-            <a:ext cx="2971800" cy="458787"/>
-          </a:xfrm>
-          <a:prstGeom prst="rect">
-            <a:avLst/>
-          </a:prstGeom>
-        </p:spPr>
-        <p:txBody>
-          <a:bodyPr vert="horz" lIns="91440" tIns="45720" rIns="91440" bIns="45720" rtlCol="0" anchor="b"/>
-          <a:lstStyle>
-            <a:lvl1pPr algn="r">
-              <a:defRPr sz="1200"/>
-            </a:lvl1pPr>
-          </a:lstStyle>
-          <a:p>
-            <a:fld id="{CE5E9CC1-C706-0F49-92D6-E571CC5EEA8F}" type="slidenum">
-              <a:rPr lang="en-US"/>
-              <a:t>‹#›</a:t>
-            </a:fld>
-            <a:endParaRPr lang="en-US"/>
-          </a:p>
-        </p:txBody>
-      </p:sp>
     </p:spTree>
     <p:extLst>
       <p:ext uri="{BB962C8B-B14F-4D97-AF65-F5344CB8AC3E}">
-        <p14:creationId xmlns:p14="http://schemas.microsoft.com/office/powerpoint/2010/main" val="1024086991"/>
+        <p14:creationId xmlns:p14="http://schemas.microsoft.com/office/powerpoint/2010/main" val="4247927620"/>
       </p:ext>
     </p:extLst>
   </p:cSld>
@@ -456,270 +237,6 @@
     </a:lvl9pPr>
   </p:notesStyle>
 </p:notesMaster>
-</file>
-
-<file path=ppt/notesSlides/notesSlide1.xml><?xml version="1.0" encoding="utf-8"?>
-<p:notes xmlns:a="http://schemas.openxmlformats.org/drawingml/2006/main" xmlns:r="http://schemas.openxmlformats.org/officeDocument/2006/relationships" xmlns:p="http://schemas.openxmlformats.org/presentationml/2006/main">
-  <p:cSld>
-    <p:spTree>
-      <p:nvGrpSpPr>
-        <p:cNvPr id="1" name=""/>
-        <p:cNvGrpSpPr/>
-        <p:nvPr/>
-      </p:nvGrpSpPr>
-      <p:grpSpPr>
-        <a:xfrm>
-          <a:off x="0" y="0"/>
-          <a:ext cx="0" cy="0"/>
-          <a:chOff x="0" y="0"/>
-          <a:chExt cx="0" cy="0"/>
-        </a:xfrm>
-      </p:grpSpPr>
-      <p:sp>
-        <p:nvSpPr>
-          <p:cNvPr id="2" name="Slide Image Placeholder 1"/>
-          <p:cNvSpPr>
-            <a:spLocks noGrp="1" noRot="1" noChangeAspect="1"/>
-          </p:cNvSpPr>
-          <p:nvPr>
-            <p:ph type="sldImg"/>
-          </p:nvPr>
-        </p:nvSpPr>
-        <p:spPr/>
-      </p:sp>
-      <p:sp>
-        <p:nvSpPr>
-          <p:cNvPr id="3" name="Notes Placeholder 2"/>
-          <p:cNvSpPr>
-            <a:spLocks noGrp="1"/>
-          </p:cNvSpPr>
-          <p:nvPr>
-            <p:ph type="body" idx="1"/>
-          </p:nvPr>
-        </p:nvSpPr>
-        <p:spPr/>
-        <p:txBody>
-          <a:bodyPr/>
-          <a:lstStyle/>
-          <a:p>
-            <a:r>
-              <a:rPr lang="en-US" dirty="0"/>
-              <a:t/>
-            </a:r>
-            <a:endParaRPr lang="en-US" dirty="0"/>
-          </a:p>
-        </p:txBody>
-      </p:sp>
-      <p:sp>
-        <p:nvSpPr>
-          <p:cNvPr id="4" name="Slide Number Placeholder 3"/>
-          <p:cNvSpPr>
-            <a:spLocks noGrp="1"/>
-          </p:cNvSpPr>
-          <p:nvPr>
-            <p:ph type="sldNum" sz="quarter" idx="10"/>
-          </p:nvPr>
-        </p:nvSpPr>
-        <p:spPr/>
-        <p:txBody>
-          <a:bodyPr/>
-          <a:lstStyle/>
-          <a:p>
-            <a:fld id="{F7021451-1387-4CA6-816F-3879F97B5CBC}" type="slidenum">
-              <a:rPr lang="en-US"/>
-              <a:t>1</a:t>
-            </a:fld>
-            <a:endParaRPr lang="en-US"/>
-          </a:p>
-        </p:txBody>
-      </p:sp>
-    </p:spTree>
-    <p:extLst>
-      <p:ext uri="{BB962C8B-B14F-4D97-AF65-F5344CB8AC3E}">
-        <p14:creationId xmlns:p14="http://schemas.microsoft.com/office/powerpoint/2010/main" val="1024086991"/>
-      </p:ext>
-    </p:extLst>
-  </p:cSld>
-  <p:clrMapOvr>
-    <a:masterClrMapping/>
-  </p:clrMapOvr>
-</p:notes>
-</file>
-
-<file path=ppt/notesSlides/notesSlide2.xml><?xml version="1.0" encoding="utf-8"?>
-<p:notes xmlns:a="http://schemas.openxmlformats.org/drawingml/2006/main" xmlns:r="http://schemas.openxmlformats.org/officeDocument/2006/relationships" xmlns:p="http://schemas.openxmlformats.org/presentationml/2006/main">
-  <p:cSld>
-    <p:spTree>
-      <p:nvGrpSpPr>
-        <p:cNvPr id="1" name=""/>
-        <p:cNvGrpSpPr/>
-        <p:nvPr/>
-      </p:nvGrpSpPr>
-      <p:grpSpPr>
-        <a:xfrm>
-          <a:off x="0" y="0"/>
-          <a:ext cx="0" cy="0"/>
-          <a:chOff x="0" y="0"/>
-          <a:chExt cx="0" cy="0"/>
-        </a:xfrm>
-      </p:grpSpPr>
-      <p:sp>
-        <p:nvSpPr>
-          <p:cNvPr id="2" name="Slide Image Placeholder 1"/>
-          <p:cNvSpPr>
-            <a:spLocks noGrp="1" noRot="1" noChangeAspect="1"/>
-          </p:cNvSpPr>
-          <p:nvPr>
-            <p:ph type="sldImg"/>
-          </p:nvPr>
-        </p:nvSpPr>
-        <p:spPr/>
-      </p:sp>
-      <p:sp>
-        <p:nvSpPr>
-          <p:cNvPr id="3" name="Notes Placeholder 2"/>
-          <p:cNvSpPr>
-            <a:spLocks noGrp="1"/>
-          </p:cNvSpPr>
-          <p:nvPr>
-            <p:ph type="body" idx="1"/>
-          </p:nvPr>
-        </p:nvSpPr>
-        <p:spPr/>
-        <p:txBody>
-          <a:bodyPr/>
-          <a:lstStyle/>
-          <a:p>
-            <a:r>
-              <a:rPr lang="en-US" dirty="0"/>
-              <a:t/>
-            </a:r>
-            <a:endParaRPr lang="en-US" dirty="0"/>
-          </a:p>
-        </p:txBody>
-      </p:sp>
-      <p:sp>
-        <p:nvSpPr>
-          <p:cNvPr id="4" name="Slide Number Placeholder 3"/>
-          <p:cNvSpPr>
-            <a:spLocks noGrp="1"/>
-          </p:cNvSpPr>
-          <p:nvPr>
-            <p:ph type="sldNum" sz="quarter" idx="10"/>
-          </p:nvPr>
-        </p:nvSpPr>
-        <p:spPr/>
-        <p:txBody>
-          <a:bodyPr/>
-          <a:lstStyle/>
-          <a:p>
-            <a:fld id="{F7021451-1387-4CA6-816F-3879F97B5CBC}" type="slidenum">
-              <a:rPr lang="en-US"/>
-              <a:t>2</a:t>
-            </a:fld>
-            <a:endParaRPr lang="en-US"/>
-          </a:p>
-        </p:txBody>
-      </p:sp>
-    </p:spTree>
-    <p:extLst>
-      <p:ext uri="{BB962C8B-B14F-4D97-AF65-F5344CB8AC3E}">
-        <p14:creationId xmlns:p14="http://schemas.microsoft.com/office/powerpoint/2010/main" val="1024086991"/>
-      </p:ext>
-    </p:extLst>
-  </p:cSld>
-  <p:clrMapOvr>
-    <a:masterClrMapping/>
-  </p:clrMapOvr>
-</p:notes>
-</file>
-
-<file path=ppt/notesSlides/notesSlide3.xml><?xml version="1.0" encoding="utf-8"?>
-<p:notes xmlns:a="http://schemas.openxmlformats.org/drawingml/2006/main" xmlns:r="http://schemas.openxmlformats.org/officeDocument/2006/relationships" xmlns:p="http://schemas.openxmlformats.org/presentationml/2006/main">
-  <p:cSld>
-    <p:spTree>
-      <p:nvGrpSpPr>
-        <p:cNvPr id="1" name=""/>
-        <p:cNvGrpSpPr/>
-        <p:nvPr/>
-      </p:nvGrpSpPr>
-      <p:grpSpPr>
-        <a:xfrm>
-          <a:off x="0" y="0"/>
-          <a:ext cx="0" cy="0"/>
-          <a:chOff x="0" y="0"/>
-          <a:chExt cx="0" cy="0"/>
-        </a:xfrm>
-      </p:grpSpPr>
-      <p:sp>
-        <p:nvSpPr>
-          <p:cNvPr id="2" name="Slide Image Placeholder 1"/>
-          <p:cNvSpPr>
-            <a:spLocks noGrp="1" noRot="1" noChangeAspect="1"/>
-          </p:cNvSpPr>
-          <p:nvPr>
-            <p:ph type="sldImg"/>
-          </p:nvPr>
-        </p:nvSpPr>
-        <p:spPr/>
-      </p:sp>
-      <p:sp>
-        <p:nvSpPr>
-          <p:cNvPr id="3" name="Notes Placeholder 2"/>
-          <p:cNvSpPr>
-            <a:spLocks noGrp="1"/>
-          </p:cNvSpPr>
-          <p:nvPr>
-            <p:ph type="body" idx="1"/>
-          </p:nvPr>
-        </p:nvSpPr>
-        <p:spPr/>
-        <p:txBody>
-          <a:bodyPr/>
-          <a:lstStyle/>
-          <a:p>
-            <a:r>
-              <a:rPr lang="en-US" dirty="0"/>
-              <a:t/>
-            </a:r>
-            <a:endParaRPr lang="en-US" dirty="0"/>
-          </a:p>
-        </p:txBody>
-      </p:sp>
-      <p:sp>
-        <p:nvSpPr>
-          <p:cNvPr id="4" name="Slide Number Placeholder 3"/>
-          <p:cNvSpPr>
-            <a:spLocks noGrp="1"/>
-          </p:cNvSpPr>
-          <p:nvPr>
-            <p:ph type="sldNum" sz="quarter" idx="10"/>
-          </p:nvPr>
-        </p:nvSpPr>
-        <p:spPr/>
-        <p:txBody>
-          <a:bodyPr/>
-          <a:lstStyle/>
-          <a:p>
-            <a:fld id="{F7021451-1387-4CA6-816F-3879F97B5CBC}" type="slidenum">
-              <a:rPr lang="en-US"/>
-              <a:t>3</a:t>
-            </a:fld>
-            <a:endParaRPr lang="en-US"/>
-          </a:p>
-        </p:txBody>
-      </p:sp>
-    </p:spTree>
-    <p:extLst>
-      <p:ext uri="{BB962C8B-B14F-4D97-AF65-F5344CB8AC3E}">
-        <p14:creationId xmlns:p14="http://schemas.microsoft.com/office/powerpoint/2010/main" val="1024086991"/>
-      </p:ext>
-    </p:extLst>
-  </p:cSld>
-  <p:clrMapOvr>
-    <a:masterClrMapping/>
-  </p:clrMapOvr>
-</p:notes>
 </file>
 
 <file path=ppt/slideLayouts/slideLayout1.xml><?xml version="1.0" encoding="utf-8"?>
@@ -755,6 +272,11 @@
 <file path=ppt/slideMasters/slideMaster1.xml><?xml version="1.0" encoding="utf-8"?>
 <p:sldMaster xmlns:a="http://schemas.openxmlformats.org/drawingml/2006/main" xmlns:r="http://schemas.openxmlformats.org/officeDocument/2006/relationships" xmlns:p="http://schemas.openxmlformats.org/presentationml/2006/main">
   <p:cSld>
+    <p:bg>
+      <p:bgRef idx="1001">
+        <a:schemeClr val="bg1"/>
+      </p:bgRef>
+    </p:bg>
     <p:spTree>
       <p:nvGrpSpPr>
         <p:cNvPr id="1" name=""/>
@@ -1031,7 +553,7 @@
 
 <file path=ppt/slides/slide1.xml><?xml version="1.0" encoding="utf-8"?>
 <p:sld xmlns:a="http://schemas.openxmlformats.org/drawingml/2006/main" xmlns:r="http://schemas.openxmlformats.org/officeDocument/2006/relationships" xmlns:p="http://schemas.openxmlformats.org/presentationml/2006/main">
-  <p:cSld name="Slide 1">
+  <p:cSld>
     <p:spTree>
       <p:nvGrpSpPr>
         <p:cNvPr id="1" name=""/>
@@ -1048,69 +570,19 @@
       </p:grpSpPr>
       <p:sp>
         <p:nvSpPr>
-          <p:cNvPr id="2" name="Text 0"/>
+          <p:cNvPr id="2" name="Text 2">
+            <a:extLst>
+              <a:ext uri="{FF2B5EF4-FFF2-40B4-BE49-F238E27FC236}">
+                <a16:creationId xmlns:a16="http://schemas.microsoft.com/office/drawing/2014/main" id="{F74F01A3-5095-CE29-1E2A-5B84725207DC}"/>
+              </a:ext>
+            </a:extLst>
+          </p:cNvPr>
           <p:cNvSpPr/>
           <p:nvPr/>
         </p:nvSpPr>
         <p:spPr>
           <a:xfrm>
-            <a:off x="0" y="0"/>
-            <a:ext cx="9144000" cy="1371600"/>
-          </a:xfrm>
-          <a:prstGeom prst="rect">
-            <a:avLst/>
-          </a:prstGeom>
-          <a:noFill/>
-          <a:ln/>
-        </p:spPr>
-        <p:txBody>
-          <a:bodyPr wrap="square" rtlCol="0" anchor="ctr"/>
-          <a:lstStyle/>
-          <a:p>
-            <a:pPr algn="ctr" indent="0" marL="0">
-              <a:buNone/>
-            </a:pPr>
-            <a:endParaRPr lang="en-US" dirty="0"/>
-          </a:p>
-        </p:txBody>
-      </p:sp>
-      <p:sp>
-        <p:nvSpPr>
-          <p:cNvPr id="3" name="Text 1"/>
-          <p:cNvSpPr/>
-          <p:nvPr/>
-        </p:nvSpPr>
-        <p:spPr>
-          <a:xfrm>
-            <a:off x="0" y="228600"/>
-            <a:ext cx="9144000" cy="1371600"/>
-          </a:xfrm>
-          <a:prstGeom prst="rect">
-            <a:avLst/>
-          </a:prstGeom>
-          <a:noFill/>
-          <a:ln/>
-        </p:spPr>
-        <p:txBody>
-          <a:bodyPr wrap="square" rtlCol="0" anchor="ctr"/>
-          <a:lstStyle/>
-          <a:p>
-            <a:pPr algn="ctr" indent="0" marL="0">
-              <a:buNone/>
-            </a:pPr>
-            <a:endParaRPr lang="en-US" dirty="0"/>
-          </a:p>
-        </p:txBody>
-      </p:sp>
-      <p:sp>
-        <p:nvSpPr>
-          <p:cNvPr id="4" name="Text 2"/>
-          <p:cNvSpPr/>
-          <p:nvPr/>
-        </p:nvSpPr>
-        <p:spPr>
-          <a:xfrm>
-            <a:off x="0" y="457200"/>
+            <a:off x="-202475" y="574765"/>
             <a:ext cx="9144000" cy="457200"/>
           </a:xfrm>
           <a:prstGeom prst="rect">
@@ -1123,7 +595,7 @@
           <a:bodyPr wrap="square" rtlCol="0" anchor="ctr"/>
           <a:lstStyle/>
           <a:p>
-            <a:pPr algn="ctr" indent="0" marL="0">
+            <a:pPr marL="0" indent="0" algn="ctr">
               <a:buNone/>
             </a:pPr>
             <a:r>
@@ -1140,35 +612,13 @@
       </p:sp>
       <p:sp>
         <p:nvSpPr>
-          <p:cNvPr id="5" name="Text 3"/>
-          <p:cNvSpPr/>
-          <p:nvPr/>
-        </p:nvSpPr>
-        <p:spPr>
-          <a:xfrm>
-            <a:off x="0" y="685800"/>
-            <a:ext cx="9144000" cy="1371600"/>
-          </a:xfrm>
-          <a:prstGeom prst="rect">
-            <a:avLst/>
-          </a:prstGeom>
-          <a:noFill/>
-          <a:ln/>
-        </p:spPr>
-        <p:txBody>
-          <a:bodyPr wrap="square" rtlCol="0" anchor="ctr"/>
-          <a:lstStyle/>
-          <a:p>
-            <a:pPr algn="ctr" indent="0" marL="0">
-              <a:buNone/>
-            </a:pPr>
-            <a:endParaRPr lang="en-US" dirty="0"/>
-          </a:p>
-        </p:txBody>
-      </p:sp>
-      <p:sp>
-        <p:nvSpPr>
-          <p:cNvPr id="6" name="Text 4"/>
+          <p:cNvPr id="4" name="Text 4">
+            <a:extLst>
+              <a:ext uri="{FF2B5EF4-FFF2-40B4-BE49-F238E27FC236}">
+                <a16:creationId xmlns:a16="http://schemas.microsoft.com/office/drawing/2014/main" id="{91F45474-6086-302E-4D2F-7DFF2DF2CA8D}"/>
+              </a:ext>
+            </a:extLst>
+          </p:cNvPr>
           <p:cNvSpPr/>
           <p:nvPr/>
         </p:nvSpPr>
@@ -1187,7 +637,7 @@
           <a:bodyPr wrap="square" rtlCol="0" anchor="ctr"/>
           <a:lstStyle/>
           <a:p>
-            <a:pPr algn="ctr" indent="0" marL="0">
+            <a:pPr marL="0" indent="0" algn="ctr">
               <a:buNone/>
             </a:pPr>
             <a:r>
@@ -1202,35 +652,12 @@
           </a:p>
         </p:txBody>
       </p:sp>
-      <p:sp>
-        <p:nvSpPr>
-          <p:cNvPr id="7" name="Text 5"/>
-          <p:cNvSpPr/>
-          <p:nvPr/>
-        </p:nvSpPr>
-        <p:spPr>
-          <a:xfrm>
-            <a:off x="0" y="1143000"/>
-            <a:ext cx="9144000" cy="1371600"/>
-          </a:xfrm>
-          <a:prstGeom prst="rect">
-            <a:avLst/>
-          </a:prstGeom>
-          <a:noFill/>
-          <a:ln/>
-        </p:spPr>
-        <p:txBody>
-          <a:bodyPr wrap="square" rtlCol="0" anchor="ctr"/>
-          <a:lstStyle/>
-          <a:p>
-            <a:pPr algn="ctr" indent="0" marL="0">
-              <a:buNone/>
-            </a:pPr>
-            <a:endParaRPr lang="en-US" dirty="0"/>
-          </a:p>
-        </p:txBody>
-      </p:sp>
     </p:spTree>
+    <p:extLst>
+      <p:ext uri="{BB962C8B-B14F-4D97-AF65-F5344CB8AC3E}">
+        <p14:creationId xmlns:p14="http://schemas.microsoft.com/office/powerpoint/2010/main" val="909519666"/>
+      </p:ext>
+    </p:extLst>
   </p:cSld>
   <p:clrMapOvr>
     <a:masterClrMapping/>
@@ -1240,7 +667,7 @@
 
 <file path=ppt/slides/slide2.xml><?xml version="1.0" encoding="utf-8"?>
 <p:sld xmlns:a="http://schemas.openxmlformats.org/drawingml/2006/main" xmlns:r="http://schemas.openxmlformats.org/officeDocument/2006/relationships" xmlns:p="http://schemas.openxmlformats.org/presentationml/2006/main">
-  <p:cSld name="Slide 2">
+  <p:cSld>
     <p:spTree>
       <p:nvGrpSpPr>
         <p:cNvPr id="1" name=""/>
@@ -1257,35 +684,13 @@
       </p:grpSpPr>
       <p:sp>
         <p:nvSpPr>
-          <p:cNvPr id="2" name="Text 0"/>
-          <p:cNvSpPr/>
-          <p:nvPr/>
-        </p:nvSpPr>
-        <p:spPr>
-          <a:xfrm>
-            <a:off x="0" y="137160"/>
-            <a:ext cx="9144000" cy="1371600"/>
-          </a:xfrm>
-          <a:prstGeom prst="rect">
-            <a:avLst/>
-          </a:prstGeom>
-          <a:noFill/>
-          <a:ln/>
-        </p:spPr>
-        <p:txBody>
-          <a:bodyPr wrap="square" rtlCol="0" anchor="ctr"/>
-          <a:lstStyle/>
-          <a:p>
-            <a:pPr algn="ctr" indent="0" marL="0">
-              <a:buNone/>
-            </a:pPr>
-            <a:endParaRPr lang="en-US" dirty="0"/>
-          </a:p>
-        </p:txBody>
-      </p:sp>
-      <p:sp>
-        <p:nvSpPr>
-          <p:cNvPr id="3" name="Text 1"/>
+          <p:cNvPr id="2" name="Text 1">
+            <a:extLst>
+              <a:ext uri="{FF2B5EF4-FFF2-40B4-BE49-F238E27FC236}">
+                <a16:creationId xmlns:a16="http://schemas.microsoft.com/office/drawing/2014/main" id="{DC68F0B7-38CB-21B6-9045-2F506FB5BD09}"/>
+              </a:ext>
+            </a:extLst>
+          </p:cNvPr>
           <p:cNvSpPr/>
           <p:nvPr/>
         </p:nvSpPr>
@@ -1304,7 +709,7 @@
           <a:bodyPr wrap="square" rtlCol="0" anchor="ctr"/>
           <a:lstStyle/>
           <a:p>
-            <a:pPr algn="ctr" indent="0" marL="0">
+            <a:pPr marL="0" indent="0" algn="ctr">
               <a:buNone/>
             </a:pPr>
             <a:r>
@@ -1321,35 +726,13 @@
       </p:sp>
       <p:sp>
         <p:nvSpPr>
-          <p:cNvPr id="4" name="Text 2"/>
-          <p:cNvSpPr/>
-          <p:nvPr/>
-        </p:nvSpPr>
-        <p:spPr>
-          <a:xfrm>
-            <a:off x="0" y="594360"/>
-            <a:ext cx="9144000" cy="1371600"/>
-          </a:xfrm>
-          <a:prstGeom prst="rect">
-            <a:avLst/>
-          </a:prstGeom>
-          <a:noFill/>
-          <a:ln/>
-        </p:spPr>
-        <p:txBody>
-          <a:bodyPr wrap="square" rtlCol="0" anchor="ctr"/>
-          <a:lstStyle/>
-          <a:p>
-            <a:pPr algn="ctr" indent="0" marL="0">
-              <a:buNone/>
-            </a:pPr>
-            <a:endParaRPr lang="en-US" dirty="0"/>
-          </a:p>
-        </p:txBody>
-      </p:sp>
-      <p:sp>
-        <p:nvSpPr>
-          <p:cNvPr id="5" name="Text 3"/>
+          <p:cNvPr id="3" name="Text 3">
+            <a:extLst>
+              <a:ext uri="{FF2B5EF4-FFF2-40B4-BE49-F238E27FC236}">
+                <a16:creationId xmlns:a16="http://schemas.microsoft.com/office/drawing/2014/main" id="{5F68729B-1D87-A6A4-C410-CB2AA439E69A}"/>
+              </a:ext>
+            </a:extLst>
+          </p:cNvPr>
           <p:cNvSpPr/>
           <p:nvPr/>
         </p:nvSpPr>
@@ -1368,7 +751,7 @@
           <a:bodyPr wrap="square" rtlCol="0" anchor="ctr"/>
           <a:lstStyle/>
           <a:p>
-            <a:pPr algn="ctr" indent="0" marL="0">
+            <a:pPr marL="0" indent="0" algn="ctr">
               <a:buNone/>
             </a:pPr>
             <a:r>
@@ -1384,6 +767,11 @@
         </p:txBody>
       </p:sp>
     </p:spTree>
+    <p:extLst>
+      <p:ext uri="{BB962C8B-B14F-4D97-AF65-F5344CB8AC3E}">
+        <p14:creationId xmlns:p14="http://schemas.microsoft.com/office/powerpoint/2010/main" val="2663962806"/>
+      </p:ext>
+    </p:extLst>
   </p:cSld>
   <p:clrMapOvr>
     <a:masterClrMapping/>
@@ -1393,7 +781,7 @@
 
 <file path=ppt/slides/slide3.xml><?xml version="1.0" encoding="utf-8"?>
 <p:sld xmlns:a="http://schemas.openxmlformats.org/drawingml/2006/main" xmlns:r="http://schemas.openxmlformats.org/officeDocument/2006/relationships" xmlns:p="http://schemas.openxmlformats.org/presentationml/2006/main">
-  <p:cSld name="Slide 3">
+  <p:cSld>
     <p:spTree>
       <p:nvGrpSpPr>
         <p:cNvPr id="1" name=""/>
@@ -1410,13 +798,19 @@
       </p:grpSpPr>
       <p:sp>
         <p:nvSpPr>
-          <p:cNvPr id="2" name="Text 0"/>
+          <p:cNvPr id="2" name="Text 0">
+            <a:extLst>
+              <a:ext uri="{FF2B5EF4-FFF2-40B4-BE49-F238E27FC236}">
+                <a16:creationId xmlns:a16="http://schemas.microsoft.com/office/drawing/2014/main" id="{9906F41A-EC58-508B-0C81-01545D7BB25B}"/>
+              </a:ext>
+            </a:extLst>
+          </p:cNvPr>
           <p:cNvSpPr/>
           <p:nvPr/>
         </p:nvSpPr>
         <p:spPr>
           <a:xfrm>
-            <a:off x="0" y="137160"/>
+            <a:off x="0" y="231866"/>
             <a:ext cx="9144000" cy="1371600"/>
           </a:xfrm>
           <a:prstGeom prst="rect">
@@ -1429,14 +823,14 @@
           <a:bodyPr wrap="square" rtlCol="0" anchor="ctr"/>
           <a:lstStyle/>
           <a:p>
-            <a:pPr algn="ctr" marL="342900" indent="-342900">
+            <a:pPr marL="342900" indent="-342900" algn="ctr">
               <a:buSzPct val="100000"/>
               <a:buChar char="•"/>
             </a:pPr>
             <a:endParaRPr lang="en-US" sz="2500" dirty="0"/>
           </a:p>
           <a:p>
-            <a:pPr algn="ctr" marL="342900" indent="-342900">
+            <a:pPr marL="342900" indent="-342900" algn="ctr">
               <a:buSzPct val="100000"/>
               <a:buChar char="•"/>
             </a:pPr>
@@ -1451,7 +845,7 @@
             <a:endParaRPr lang="en-US" sz="2500" dirty="0"/>
           </a:p>
           <a:p>
-            <a:pPr algn="ctr" marL="342900" indent="-342900">
+            <a:pPr marL="342900" indent="-342900" algn="ctr">
               <a:buSzPct val="100000"/>
               <a:buChar char="•"/>
             </a:pPr>
@@ -1466,7 +860,7 @@
             <a:endParaRPr lang="en-US" sz="2500" dirty="0"/>
           </a:p>
           <a:p>
-            <a:pPr algn="ctr" marL="342900" indent="-342900">
+            <a:pPr marL="342900" indent="-342900" algn="ctr">
               <a:buSzPct val="100000"/>
               <a:buChar char="•"/>
             </a:pPr>
@@ -1484,13 +878,19 @@
       </p:sp>
       <p:sp>
         <p:nvSpPr>
-          <p:cNvPr id="3" name="Text 1"/>
+          <p:cNvPr id="3" name="Text 1">
+            <a:extLst>
+              <a:ext uri="{FF2B5EF4-FFF2-40B4-BE49-F238E27FC236}">
+                <a16:creationId xmlns:a16="http://schemas.microsoft.com/office/drawing/2014/main" id="{9443D4DF-6A15-2A62-DE5D-715C8EC8766B}"/>
+              </a:ext>
+            </a:extLst>
+          </p:cNvPr>
           <p:cNvSpPr/>
           <p:nvPr/>
         </p:nvSpPr>
         <p:spPr>
           <a:xfrm>
-            <a:off x="0" y="1234440"/>
+            <a:off x="0" y="1885950"/>
             <a:ext cx="9144000" cy="1371600"/>
           </a:xfrm>
           <a:prstGeom prst="rect">
@@ -1503,7 +903,7 @@
           <a:bodyPr wrap="square" rtlCol="0" anchor="ctr"/>
           <a:lstStyle/>
           <a:p>
-            <a:pPr algn="ctr" indent="0" marL="0">
+            <a:pPr marL="0" indent="0" algn="ctr">
               <a:buNone/>
             </a:pPr>
             <a:r>
@@ -1518,35 +918,12 @@
           </a:p>
         </p:txBody>
       </p:sp>
-      <p:sp>
-        <p:nvSpPr>
-          <p:cNvPr id="4" name="Text 2"/>
-          <p:cNvSpPr/>
-          <p:nvPr/>
-        </p:nvSpPr>
-        <p:spPr>
-          <a:xfrm>
-            <a:off x="0" y="1463040"/>
-            <a:ext cx="9144000" cy="1371600"/>
-          </a:xfrm>
-          <a:prstGeom prst="rect">
-            <a:avLst/>
-          </a:prstGeom>
-          <a:noFill/>
-          <a:ln/>
-        </p:spPr>
-        <p:txBody>
-          <a:bodyPr wrap="square" rtlCol="0" anchor="ctr"/>
-          <a:lstStyle/>
-          <a:p>
-            <a:pPr algn="ctr" indent="0" marL="0">
-              <a:buNone/>
-            </a:pPr>
-            <a:endParaRPr lang="en-US" dirty="0"/>
-          </a:p>
-        </p:txBody>
-      </p:sp>
     </p:spTree>
+    <p:extLst>
+      <p:ext uri="{BB962C8B-B14F-4D97-AF65-F5344CB8AC3E}">
+        <p14:creationId xmlns:p14="http://schemas.microsoft.com/office/powerpoint/2010/main" val="1970495560"/>
+      </p:ext>
+    </p:extLst>
   </p:cSld>
   <p:clrMapOvr>
     <a:masterClrMapping/>
@@ -1847,4 +1224,299 @@
     </a:ext>
   </a:extLst>
 </a:theme>
+</file>
+
+<file path=ppt/theme/theme2.xml><?xml version="1.0" encoding="utf-8"?>
+<a:theme xmlns:a="http://schemas.openxmlformats.org/drawingml/2006/main" name="Office Theme">
+  <a:themeElements>
+    <a:clrScheme name="Office">
+      <a:dk1>
+        <a:sysClr val="windowText" lastClr="000000"/>
+      </a:dk1>
+      <a:lt1>
+        <a:sysClr val="window" lastClr="FFFFFF"/>
+      </a:lt1>
+      <a:dk2>
+        <a:srgbClr val="44546A"/>
+      </a:dk2>
+      <a:lt2>
+        <a:srgbClr val="E7E6E6"/>
+      </a:lt2>
+      <a:accent1>
+        <a:srgbClr val="4472C4"/>
+      </a:accent1>
+      <a:accent2>
+        <a:srgbClr val="ED7D31"/>
+      </a:accent2>
+      <a:accent3>
+        <a:srgbClr val="A5A5A5"/>
+      </a:accent3>
+      <a:accent4>
+        <a:srgbClr val="FFC000"/>
+      </a:accent4>
+      <a:accent5>
+        <a:srgbClr val="5B9BD5"/>
+      </a:accent5>
+      <a:accent6>
+        <a:srgbClr val="70AD47"/>
+      </a:accent6>
+      <a:hlink>
+        <a:srgbClr val="0563C1"/>
+      </a:hlink>
+      <a:folHlink>
+        <a:srgbClr val="954F72"/>
+      </a:folHlink>
+    </a:clrScheme>
+    <a:fontScheme name="Office">
+      <a:majorFont>
+        <a:latin typeface="Calibri Light" panose="020F0302020204030204"/>
+        <a:ea typeface=""/>
+        <a:cs typeface=""/>
+        <a:font script="Jpan" typeface="游ゴシック Light"/>
+        <a:font script="Hang" typeface="맑은 고딕"/>
+        <a:font script="Hans" typeface="等线 Light"/>
+        <a:font script="Hant" typeface="新細明體"/>
+        <a:font script="Arab" typeface="Times New Roman"/>
+        <a:font script="Hebr" typeface="Times New Roman"/>
+        <a:font script="Thai" typeface="Angsana New"/>
+        <a:font script="Ethi" typeface="Nyala"/>
+        <a:font script="Beng" typeface="Vrinda"/>
+        <a:font script="Gujr" typeface="Shruti"/>
+        <a:font script="Khmr" typeface="MoolBoran"/>
+        <a:font script="Knda" typeface="Tunga"/>
+        <a:font script="Guru" typeface="Raavi"/>
+        <a:font script="Cans" typeface="Euphemia"/>
+        <a:font script="Cher" typeface="Plantagenet Cherokee"/>
+        <a:font script="Yiii" typeface="Microsoft Yi Baiti"/>
+        <a:font script="Tibt" typeface="Microsoft Himalaya"/>
+        <a:font script="Thaa" typeface="MV Boli"/>
+        <a:font script="Deva" typeface="Mangal"/>
+        <a:font script="Telu" typeface="Gautami"/>
+        <a:font script="Taml" typeface="Latha"/>
+        <a:font script="Syrc" typeface="Estrangelo Edessa"/>
+        <a:font script="Orya" typeface="Kalinga"/>
+        <a:font script="Mlym" typeface="Kartika"/>
+        <a:font script="Laoo" typeface="DokChampa"/>
+        <a:font script="Sinh" typeface="Iskoola Pota"/>
+        <a:font script="Mong" typeface="Mongolian Baiti"/>
+        <a:font script="Viet" typeface="Times New Roman"/>
+        <a:font script="Uigh" typeface="Microsoft Uighur"/>
+        <a:font script="Geor" typeface="Sylfaen"/>
+        <a:font script="Armn" typeface="Arial"/>
+        <a:font script="Bugi" typeface="Leelawadee UI"/>
+        <a:font script="Bopo" typeface="Microsoft JhengHei"/>
+        <a:font script="Java" typeface="Javanese Text"/>
+        <a:font script="Lisu" typeface="Segoe UI"/>
+        <a:font script="Mymr" typeface="Myanmar Text"/>
+        <a:font script="Nkoo" typeface="Ebrima"/>
+        <a:font script="Olck" typeface="Nirmala UI"/>
+        <a:font script="Osma" typeface="Ebrima"/>
+        <a:font script="Phag" typeface="Phagspa"/>
+        <a:font script="Syrn" typeface="Estrangelo Edessa"/>
+        <a:font script="Syrj" typeface="Estrangelo Edessa"/>
+        <a:font script="Syre" typeface="Estrangelo Edessa"/>
+        <a:font script="Sora" typeface="Nirmala UI"/>
+        <a:font script="Tale" typeface="Microsoft Tai Le"/>
+        <a:font script="Talu" typeface="Microsoft New Tai Lue"/>
+        <a:font script="Tfng" typeface="Ebrima"/>
+      </a:majorFont>
+      <a:minorFont>
+        <a:latin typeface="Calibri" panose="020F0502020204030204"/>
+        <a:ea typeface=""/>
+        <a:cs typeface=""/>
+        <a:font script="Jpan" typeface="游ゴシック"/>
+        <a:font script="Hang" typeface="맑은 고딕"/>
+        <a:font script="Hans" typeface="等线"/>
+        <a:font script="Hant" typeface="新細明體"/>
+        <a:font script="Arab" typeface="Arial"/>
+        <a:font script="Hebr" typeface="Arial"/>
+        <a:font script="Thai" typeface="Cordia New"/>
+        <a:font script="Ethi" typeface="Nyala"/>
+        <a:font script="Beng" typeface="Vrinda"/>
+        <a:font script="Gujr" typeface="Shruti"/>
+        <a:font script="Khmr" typeface="DaunPenh"/>
+        <a:font script="Knda" typeface="Tunga"/>
+        <a:font script="Guru" typeface="Raavi"/>
+        <a:font script="Cans" typeface="Euphemia"/>
+        <a:font script="Cher" typeface="Plantagenet Cherokee"/>
+        <a:font script="Yiii" typeface="Microsoft Yi Baiti"/>
+        <a:font script="Tibt" typeface="Microsoft Himalaya"/>
+        <a:font script="Thaa" typeface="MV Boli"/>
+        <a:font script="Deva" typeface="Mangal"/>
+        <a:font script="Telu" typeface="Gautami"/>
+        <a:font script="Taml" typeface="Latha"/>
+        <a:font script="Syrc" typeface="Estrangelo Edessa"/>
+        <a:font script="Orya" typeface="Kalinga"/>
+        <a:font script="Mlym" typeface="Kartika"/>
+        <a:font script="Laoo" typeface="DokChampa"/>
+        <a:font script="Sinh" typeface="Iskoola Pota"/>
+        <a:font script="Mong" typeface="Mongolian Baiti"/>
+        <a:font script="Viet" typeface="Arial"/>
+        <a:font script="Uigh" typeface="Microsoft Uighur"/>
+        <a:font script="Geor" typeface="Sylfaen"/>
+        <a:font script="Armn" typeface="Arial"/>
+        <a:font script="Bugi" typeface="Leelawadee UI"/>
+        <a:font script="Bopo" typeface="Microsoft JhengHei"/>
+        <a:font script="Java" typeface="Javanese Text"/>
+        <a:font script="Lisu" typeface="Segoe UI"/>
+        <a:font script="Mymr" typeface="Myanmar Text"/>
+        <a:font script="Nkoo" typeface="Ebrima"/>
+        <a:font script="Olck" typeface="Nirmala UI"/>
+        <a:font script="Osma" typeface="Ebrima"/>
+        <a:font script="Phag" typeface="Phagspa"/>
+        <a:font script="Syrn" typeface="Estrangelo Edessa"/>
+        <a:font script="Syrj" typeface="Estrangelo Edessa"/>
+        <a:font script="Syre" typeface="Estrangelo Edessa"/>
+        <a:font script="Sora" typeface="Nirmala UI"/>
+        <a:font script="Tale" typeface="Microsoft Tai Le"/>
+        <a:font script="Talu" typeface="Microsoft New Tai Lue"/>
+        <a:font script="Tfng" typeface="Ebrima"/>
+      </a:minorFont>
+    </a:fontScheme>
+    <a:fmtScheme name="Office">
+      <a:fillStyleLst>
+        <a:solidFill>
+          <a:schemeClr val="phClr"/>
+        </a:solidFill>
+        <a:gradFill rotWithShape="1">
+          <a:gsLst>
+            <a:gs pos="0">
+              <a:schemeClr val="phClr">
+                <a:lumMod val="110000"/>
+                <a:satMod val="105000"/>
+                <a:tint val="67000"/>
+              </a:schemeClr>
+            </a:gs>
+            <a:gs pos="50000">
+              <a:schemeClr val="phClr">
+                <a:lumMod val="105000"/>
+                <a:satMod val="103000"/>
+                <a:tint val="73000"/>
+              </a:schemeClr>
+            </a:gs>
+            <a:gs pos="100000">
+              <a:schemeClr val="phClr">
+                <a:lumMod val="105000"/>
+                <a:satMod val="109000"/>
+                <a:tint val="81000"/>
+              </a:schemeClr>
+            </a:gs>
+          </a:gsLst>
+          <a:lin ang="5400000" scaled="0"/>
+        </a:gradFill>
+        <a:gradFill rotWithShape="1">
+          <a:gsLst>
+            <a:gs pos="0">
+              <a:schemeClr val="phClr">
+                <a:satMod val="103000"/>
+                <a:lumMod val="102000"/>
+                <a:tint val="94000"/>
+              </a:schemeClr>
+            </a:gs>
+            <a:gs pos="50000">
+              <a:schemeClr val="phClr">
+                <a:satMod val="110000"/>
+                <a:lumMod val="100000"/>
+                <a:shade val="100000"/>
+              </a:schemeClr>
+            </a:gs>
+            <a:gs pos="100000">
+              <a:schemeClr val="phClr">
+                <a:lumMod val="99000"/>
+                <a:satMod val="120000"/>
+                <a:shade val="78000"/>
+              </a:schemeClr>
+            </a:gs>
+          </a:gsLst>
+          <a:lin ang="5400000" scaled="0"/>
+        </a:gradFill>
+      </a:fillStyleLst>
+      <a:lnStyleLst>
+        <a:ln w="6350" cap="flat" cmpd="sng" algn="ctr">
+          <a:solidFill>
+            <a:schemeClr val="phClr"/>
+          </a:solidFill>
+          <a:prstDash val="solid"/>
+          <a:miter lim="800000"/>
+        </a:ln>
+        <a:ln w="12700" cap="flat" cmpd="sng" algn="ctr">
+          <a:solidFill>
+            <a:schemeClr val="phClr"/>
+          </a:solidFill>
+          <a:prstDash val="solid"/>
+          <a:miter lim="800000"/>
+        </a:ln>
+        <a:ln w="19050" cap="flat" cmpd="sng" algn="ctr">
+          <a:solidFill>
+            <a:schemeClr val="phClr"/>
+          </a:solidFill>
+          <a:prstDash val="solid"/>
+          <a:miter lim="800000"/>
+        </a:ln>
+      </a:lnStyleLst>
+      <a:effectStyleLst>
+        <a:effectStyle>
+          <a:effectLst/>
+        </a:effectStyle>
+        <a:effectStyle>
+          <a:effectLst/>
+        </a:effectStyle>
+        <a:effectStyle>
+          <a:effectLst>
+            <a:outerShdw blurRad="57150" dist="19050" dir="5400000" algn="ctr" rotWithShape="0">
+              <a:srgbClr val="000000">
+                <a:alpha val="63000"/>
+              </a:srgbClr>
+            </a:outerShdw>
+          </a:effectLst>
+        </a:effectStyle>
+      </a:effectStyleLst>
+      <a:bgFillStyleLst>
+        <a:solidFill>
+          <a:schemeClr val="phClr"/>
+        </a:solidFill>
+        <a:solidFill>
+          <a:schemeClr val="phClr">
+            <a:tint val="95000"/>
+            <a:satMod val="170000"/>
+          </a:schemeClr>
+        </a:solidFill>
+        <a:gradFill rotWithShape="1">
+          <a:gsLst>
+            <a:gs pos="0">
+              <a:schemeClr val="phClr">
+                <a:tint val="93000"/>
+                <a:satMod val="150000"/>
+                <a:shade val="98000"/>
+                <a:lumMod val="102000"/>
+              </a:schemeClr>
+            </a:gs>
+            <a:gs pos="50000">
+              <a:schemeClr val="phClr">
+                <a:tint val="98000"/>
+                <a:satMod val="130000"/>
+                <a:shade val="90000"/>
+                <a:lumMod val="103000"/>
+              </a:schemeClr>
+            </a:gs>
+            <a:gs pos="100000">
+              <a:schemeClr val="phClr">
+                <a:shade val="63000"/>
+                <a:satMod val="120000"/>
+              </a:schemeClr>
+            </a:gs>
+          </a:gsLst>
+          <a:lin ang="5400000" scaled="0"/>
+        </a:gradFill>
+      </a:bgFillStyleLst>
+    </a:fmtScheme>
+  </a:themeElements>
+  <a:objectDefaults/>
+  <a:extraClrSchemeLst/>
+  <a:extLst>
+    <a:ext uri="{05A4C25C-085E-4340-85A3-A5531E510DB2}">
+      <thm15:themeFamily xmlns:thm15="http://schemas.microsoft.com/office/thememl/2012/main" name="Office Theme 2013 - 2022" id="{62F939B6-93AF-4DB8-9C6B-D6C7DFDC589F}" vid="{4A3C46E8-61CC-4603-A589-7422A47A8E4A}"/>
+    </a:ext>
+  </a:extLst>
+</a:theme>
 </file>
</xml_diff>

<commit_message>
bold, italic and bold&Italic done
</commit_message>
<xml_diff>
--- a/md_ppt/test_results/test.pptx
+++ b/md_ppt/test_results/test.pptx
@@ -8,7 +8,7 @@
     <p:notesMasterId r:id="rId3"/>
   </p:notesMasterIdLst>
   <p:sldIdLst>
-    <p:sldId id="261" r:id="rId2"/>
+    <p:sldId id="256" r:id="rId2"/>
   </p:sldIdLst>
   <p:sldSz cx="9144000" cy="5143500" type="screen16x9"/>
   <p:notesSz cx="5143500" cy="9144000"/>
@@ -611,159 +611,55 @@
       </p:grpSpPr>
       <p:sp>
         <p:nvSpPr>
-          <p:cNvPr id="4" name="Text 0">
+          <p:cNvPr id="2" name="TextBox 1">
             <a:extLst>
               <a:ext uri="{FF2B5EF4-FFF2-40B4-BE49-F238E27FC236}">
-                <a16:creationId xmlns:a16="http://schemas.microsoft.com/office/drawing/2014/main" id="{E1A5D232-0C82-DF8B-2F8F-0787F549F4D7}"/>
+                <a16:creationId xmlns:a16="http://schemas.microsoft.com/office/drawing/2014/main" id="{3C3EEB4B-BB8F-6D4F-67D1-FE8EE11A7970}"/>
               </a:ext>
             </a:extLst>
           </p:cNvPr>
-          <p:cNvSpPr/>
+          <p:cNvSpPr txBox="1"/>
           <p:nvPr/>
         </p:nvSpPr>
         <p:spPr>
           <a:xfrm>
-            <a:off x="0" y="1382489"/>
-            <a:ext cx="9144000" cy="1371600"/>
+            <a:off x="1448873" y="457199"/>
+            <a:ext cx="6561786" cy="369332"/>
           </a:xfrm>
           <a:prstGeom prst="rect">
             <a:avLst/>
           </a:prstGeom>
           <a:noFill/>
-          <a:ln/>
         </p:spPr>
         <p:txBody>
-          <a:bodyPr wrap="square" rtlCol="0" anchor="ctr"/>
+          <a:bodyPr wrap="square" rtlCol="0">
+            <a:spAutoFit/>
+          </a:bodyPr>
           <a:lstStyle/>
           <a:p>
-            <a:pPr marL="457200" indent="-457200" algn="ctr">
-              <a:buSzPct val="100000"/>
-              <a:buFont typeface="+mj-lt"/>
-              <a:buAutoNum type="arabicPeriod"/>
-            </a:pPr>
             <a:r>
-              <a:rPr lang="en-US" sz="2500" b="0" dirty="0">
-                <a:solidFill>
-                  <a:srgbClr val="000000"/>
-                </a:solidFill>
-              </a:rPr>
-              <a:t> list item1.</a:t>
+              <a:rPr lang="en-US" dirty="0"/>
+              <a:t>This word is </a:t>
             </a:r>
-            <a:endParaRPr lang="en-US" sz="2500" dirty="0"/>
-          </a:p>
-          <a:p>
-            <a:pPr marL="457200" indent="-457200" algn="ctr">
-              <a:buSzPct val="100000"/>
-              <a:buFont typeface="+mj-lt"/>
-              <a:buAutoNum type="arabicPeriod"/>
-            </a:pPr>
             <a:r>
-              <a:rPr lang="en-US" sz="2500" b="0" dirty="0">
-                <a:solidFill>
-                  <a:srgbClr val="000000"/>
-                </a:solidFill>
-              </a:rPr>
-              <a:t> list item2.</a:t>
+              <a:rPr lang="en-US" i="1" dirty="0"/>
+              <a:t>italic </a:t>
             </a:r>
-            <a:endParaRPr lang="en-US" sz="2500" dirty="0"/>
-          </a:p>
-          <a:p>
-            <a:pPr marL="457200" indent="-457200" algn="ctr">
-              <a:buSzPct val="100000"/>
-              <a:buFont typeface="+mj-lt"/>
-              <a:buAutoNum type="arabicPeriod"/>
-            </a:pPr>
             <a:r>
-              <a:rPr lang="en-US" sz="2500" b="0" dirty="0">
-                <a:solidFill>
-                  <a:srgbClr val="000000"/>
-                </a:solidFill>
-              </a:rPr>
-              <a:t> list item3.</a:t>
+              <a:rPr lang="en-US" b="1" dirty="0"/>
+              <a:t>bold </a:t>
             </a:r>
-          </a:p>
-          <a:p>
-            <a:pPr algn="ctr">
-              <a:buSzPct val="100000"/>
-            </a:pPr>
             <a:r>
-              <a:rPr lang="en-US" sz="2500">
-                <a:solidFill>
-                  <a:srgbClr val="000000"/>
-                </a:solidFill>
-              </a:rPr>
-              <a:t> </a:t>
+              <a:rPr lang="en-US" b="1" i="1" dirty="0"/>
+              <a:t>finally</a:t>
             </a:r>
-            <a:endParaRPr lang="en-US" sz="2500" dirty="0">
-              <a:solidFill>
-                <a:srgbClr val="000000"/>
-              </a:solidFill>
-            </a:endParaRPr>
-          </a:p>
-          <a:p>
-            <a:pPr marL="457200" indent="-457200" algn="ctr">
-              <a:buSzPct val="100000"/>
-              <a:buFont typeface="+mj-lt"/>
-              <a:buAutoNum type="arabicPeriod"/>
-            </a:pPr>
-            <a:r>
-              <a:rPr lang="en-US" sz="2500" dirty="0" err="1">
-                <a:solidFill>
-                  <a:srgbClr val="000000"/>
-                </a:solidFill>
-              </a:rPr>
-              <a:t>Eso</a:t>
-            </a:r>
-            <a:endParaRPr lang="en-US" sz="2500" dirty="0">
-              <a:solidFill>
-                <a:srgbClr val="000000"/>
-              </a:solidFill>
-            </a:endParaRPr>
-          </a:p>
-          <a:p>
-            <a:pPr marL="457200" indent="-457200" algn="ctr">
-              <a:buSzPct val="100000"/>
-              <a:buFont typeface="+mj-lt"/>
-              <a:buAutoNum type="arabicPeriod"/>
-            </a:pPr>
-            <a:r>
-              <a:rPr lang="en-US" sz="2500" dirty="0">
-                <a:solidFill>
-                  <a:srgbClr val="000000"/>
-                </a:solidFill>
-              </a:rPr>
-              <a:t>No </a:t>
-            </a:r>
-          </a:p>
-          <a:p>
-            <a:pPr marL="457200" indent="-457200" algn="ctr">
-              <a:buSzPct val="100000"/>
-              <a:buFont typeface="+mj-lt"/>
-              <a:buAutoNum type="arabicPeriod"/>
-            </a:pPr>
-            <a:r>
-              <a:rPr lang="en-US" sz="2500" dirty="0">
-                <a:solidFill>
-                  <a:srgbClr val="000000"/>
-                </a:solidFill>
-              </a:rPr>
-              <a:t>Es</a:t>
-            </a:r>
-          </a:p>
-          <a:p>
-            <a:pPr marL="457200" indent="-457200" algn="ctr">
-              <a:buSzPct val="100000"/>
-              <a:buFont typeface="+mj-lt"/>
-              <a:buAutoNum type="arabicPeriod"/>
-            </a:pPr>
-            <a:endParaRPr lang="en-US" sz="2500" dirty="0"/>
           </a:p>
         </p:txBody>
       </p:sp>
     </p:spTree>
     <p:extLst>
       <p:ext uri="{BB962C8B-B14F-4D97-AF65-F5344CB8AC3E}">
-        <p14:creationId xmlns:p14="http://schemas.microsoft.com/office/powerpoint/2010/main" val="1970495560"/>
+        <p14:creationId xmlns:p14="http://schemas.microsoft.com/office/powerpoint/2010/main" val="1429422657"/>
       </p:ext>
     </p:extLst>
   </p:cSld>

</xml_diff>

<commit_message>
code note done and spacing adjustments
</commit_message>
<xml_diff>
--- a/md_ppt/test_results/test.pptx
+++ b/md_ppt/test_results/test.pptx
@@ -611,10 +611,10 @@
       </p:grpSpPr>
       <p:sp>
         <p:nvSpPr>
-          <p:cNvPr id="3" name="TextBox 2">
+          <p:cNvPr id="4" name="TextBox 3">
             <a:extLst>
               <a:ext uri="{FF2B5EF4-FFF2-40B4-BE49-F238E27FC236}">
-                <a16:creationId xmlns:a16="http://schemas.microsoft.com/office/drawing/2014/main" id="{DFD60E7C-A1F5-0288-1A4E-4389CC6388BD}"/>
+                <a16:creationId xmlns:a16="http://schemas.microsoft.com/office/drawing/2014/main" id="{E18B0EAC-DFF5-E5A9-3A4C-08886DF50D2A}"/>
               </a:ext>
             </a:extLst>
           </p:cNvPr>
@@ -623,18 +623,13 @@
         </p:nvSpPr>
         <p:spPr>
           <a:xfrm>
-            <a:off x="618184" y="238257"/>
-            <a:ext cx="4668591" cy="1692771"/>
+            <a:off x="653143" y="293913"/>
+            <a:ext cx="2952206" cy="646331"/>
           </a:xfrm>
           <a:prstGeom prst="rect">
             <a:avLst/>
           </a:prstGeom>
-          <a:solidFill>
-            <a:schemeClr val="tx2">
-              <a:lumMod val="20000"/>
-              <a:lumOff val="80000"/>
-            </a:schemeClr>
-          </a:solidFill>
+          <a:noFill/>
         </p:spPr>
         <p:txBody>
           <a:bodyPr wrap="square" rtlCol="0">
@@ -643,12 +638,75 @@
           <a:lstStyle/>
           <a:p>
             <a:r>
-              <a:rPr lang="en-US" b="1" dirty="0"/>
-              <a:t>TEXT </a:t>
-            </a:r>
-            <a:r>
-              <a:rPr lang="en-US" i="1" dirty="0"/>
-              <a:t>lines1</a:t>
+              <a:rPr lang="en-US" dirty="0"/>
+              <a:t>Text </a:t>
+            </a:r>
+            <a:r>
+              <a:rPr lang="en-US" dirty="0">
+                <a:highlight>
+                  <a:srgbClr val="C0C0C0"/>
+                </a:highlight>
+              </a:rPr>
+              <a:t>code</a:t>
+            </a:r>
+            <a:r>
+              <a:rPr lang="en-US" dirty="0"/>
+              <a:t> </a:t>
+            </a:r>
+            <a:r>
+              <a:rPr lang="en-US" dirty="0" err="1"/>
+              <a:t>interesante</a:t>
+            </a:r>
+            <a:endParaRPr lang="en-US" dirty="0"/>
+          </a:p>
+          <a:p>
+            <a:r>
+              <a:rPr lang="en-US" dirty="0"/>
+              <a:t>Pero hay que </a:t>
+            </a:r>
+            <a:r>
+              <a:rPr lang="en-US" dirty="0" err="1"/>
+              <a:t>ver</a:t>
+            </a:r>
+            <a:endParaRPr lang="en-US" dirty="0"/>
+          </a:p>
+        </p:txBody>
+      </p:sp>
+      <p:sp>
+        <p:nvSpPr>
+          <p:cNvPr id="3" name="TextBox 2">
+            <a:extLst>
+              <a:ext uri="{FF2B5EF4-FFF2-40B4-BE49-F238E27FC236}">
+                <a16:creationId xmlns:a16="http://schemas.microsoft.com/office/drawing/2014/main" id="{D89E882A-8DD0-6236-35C2-F1F65FE56EEA}"/>
+              </a:ext>
+            </a:extLst>
+          </p:cNvPr>
+          <p:cNvSpPr txBox="1"/>
+          <p:nvPr/>
+        </p:nvSpPr>
+        <p:spPr>
+          <a:xfrm>
+            <a:off x="2286000" y="2250218"/>
+            <a:ext cx="4572000" cy="1138773"/>
+          </a:xfrm>
+          <a:prstGeom prst="rect">
+            <a:avLst/>
+          </a:prstGeom>
+          <a:noFill/>
+        </p:spPr>
+        <p:txBody>
+          <a:bodyPr wrap="square">
+            <a:spAutoFit/>
+          </a:bodyPr>
+          <a:lstStyle/>
+          <a:p>
+            <a:pPr marL="285750" indent="-285750">
+              <a:buFont typeface="Arial" panose="020B0604020202020204" pitchFamily="34" charset="0"/>
+              <a:buChar char="•"/>
+            </a:pPr>
+            <a:r>
+              <a:rPr lang="en-US" dirty="0"/>
+              <a:t>LINEA INTERESANTE 1</a:t>
             </a:r>
           </a:p>
           <a:p>
@@ -657,34 +715,18 @@
               <a:buChar char="•"/>
             </a:pPr>
             <a:r>
-              <a:rPr lang="en-US" dirty="0"/>
-              <a:t>line2</a:t>
+              <a:rPr lang="en-US" sz="3200" dirty="0"/>
+              <a:t>LINEA INTERESANTE 2</a:t>
             </a:r>
           </a:p>
           <a:p>
-            <a:r>
-              <a:rPr lang="en-US" sz="3200" dirty="0"/>
-              <a:t>Line3</a:t>
-            </a:r>
-          </a:p>
-          <a:p>
-            <a:pPr marL="342900" indent="-342900">
-              <a:buFont typeface="+mj-lt"/>
-              <a:buAutoNum type="arabicPeriod"/>
+            <a:pPr marL="285750" indent="-285750">
+              <a:buFont typeface="Arial" panose="020B0604020202020204" pitchFamily="34" charset="0"/>
+              <a:buChar char="•"/>
             </a:pPr>
             <a:r>
               <a:rPr lang="en-US" dirty="0"/>
-              <a:t>Line4</a:t>
-            </a:r>
-          </a:p>
-          <a:p>
-            <a:pPr marL="342900" indent="-342900">
-              <a:buFont typeface="+mj-lt"/>
-              <a:buAutoNum type="arabicPeriod"/>
-            </a:pPr>
-            <a:r>
-              <a:rPr lang="en-US" dirty="0"/>
-              <a:t>line5s</a:t>
+              <a:t>LINEA INTERESANTE 3</a:t>
             </a:r>
           </a:p>
         </p:txBody>
@@ -694,7 +736,7 @@
           <p:cNvPr id="2" name="TextBox 1">
             <a:extLst>
               <a:ext uri="{FF2B5EF4-FFF2-40B4-BE49-F238E27FC236}">
-                <a16:creationId xmlns:a16="http://schemas.microsoft.com/office/drawing/2014/main" id="{2564E41E-1737-5623-5F30-A27AA77D4009}"/>
+                <a16:creationId xmlns:a16="http://schemas.microsoft.com/office/drawing/2014/main" id="{A3C01E68-D5CD-93D2-0A84-7041C091FE4B}"/>
               </a:ext>
             </a:extLst>
           </p:cNvPr>
@@ -703,73 +745,75 @@
         </p:nvSpPr>
         <p:spPr>
           <a:xfrm>
-            <a:off x="502276" y="2446986"/>
-            <a:ext cx="965329" cy="2031325"/>
+            <a:off x="653143" y="1223553"/>
+            <a:ext cx="2952206" cy="1477328"/>
           </a:xfrm>
           <a:prstGeom prst="rect">
             <a:avLst/>
           </a:prstGeom>
-          <a:noFill/>
+          <a:solidFill>
+            <a:schemeClr val="bg2">
+              <a:lumMod val="90000"/>
+            </a:schemeClr>
+          </a:solidFill>
         </p:spPr>
         <p:txBody>
-          <a:bodyPr wrap="none" rtlCol="0">
+          <a:bodyPr wrap="square" rtlCol="0">
             <a:spAutoFit/>
           </a:bodyPr>
           <a:lstStyle/>
           <a:p>
-            <a:pPr marL="285750" indent="-285750">
-              <a:buFont typeface="Arial" panose="020B0604020202020204" pitchFamily="34" charset="0"/>
-              <a:buChar char="•"/>
-            </a:pPr>
             <a:r>
               <a:rPr lang="en-US" dirty="0"/>
-              <a:t>CAP</a:t>
-            </a:r>
-          </a:p>
-          <a:p>
-            <a:pPr marL="285750" indent="-285750">
-              <a:buFont typeface="Arial" panose="020B0604020202020204" pitchFamily="34" charset="0"/>
-              <a:buChar char="•"/>
-            </a:pPr>
-            <a:r>
-              <a:rPr lang="en-US" dirty="0"/>
-              <a:t>CAP2</a:t>
-            </a:r>
-          </a:p>
-          <a:p>
-            <a:pPr marL="342900" indent="-342900">
-              <a:buFont typeface="+mj-lt"/>
-              <a:buAutoNum type="arabicPeriod"/>
-            </a:pPr>
-            <a:r>
-              <a:rPr lang="en-US" dirty="0"/>
-              <a:t>CAP</a:t>
-            </a:r>
-          </a:p>
-          <a:p>
-            <a:pPr marL="342900" indent="-342900">
-              <a:buFont typeface="+mj-lt"/>
-              <a:buAutoNum type="arabicPeriod"/>
-            </a:pPr>
-            <a:r>
-              <a:rPr lang="en-US" dirty="0"/>
-              <a:t>CAP</a:t>
-            </a:r>
-          </a:p>
-          <a:p>
-            <a:pPr marL="342900" indent="-342900">
-              <a:buFont typeface="+mj-lt"/>
-              <a:buAutoNum type="arabicPeriod"/>
-            </a:pPr>
-            <a:r>
-              <a:rPr lang="en-US" dirty="0"/>
-              <a:t>CAP</a:t>
-            </a:r>
-          </a:p>
-          <a:p>
+              <a:t>Text code </a:t>
+            </a:r>
+            <a:r>
+              <a:rPr lang="en-US" dirty="0" err="1"/>
+              <a:t>interesante</a:t>
+            </a:r>
             <a:endParaRPr lang="en-US" dirty="0"/>
           </a:p>
           <a:p>
+            <a:r>
+              <a:rPr lang="en-US" dirty="0"/>
+              <a:t>Pero </a:t>
+            </a:r>
+            <a:r>
+              <a:rPr lang="en-US" b="1" dirty="0"/>
+              <a:t>hay </a:t>
+            </a:r>
+            <a:r>
+              <a:rPr lang="en-US" b="1" i="1" dirty="0"/>
+              <a:t>que</a:t>
+            </a:r>
+            <a:r>
+              <a:rPr lang="en-US" b="1" dirty="0"/>
+              <a:t> </a:t>
+            </a:r>
+            <a:r>
+              <a:rPr lang="en-US" dirty="0" err="1"/>
+              <a:t>ver</a:t>
+            </a:r>
+            <a:endParaRPr lang="en-US" dirty="0"/>
+          </a:p>
+          <a:p>
+            <a:r>
+              <a:rPr lang="en-US" dirty="0"/>
+              <a:t>     </a:t>
+            </a:r>
+          </a:p>
+          <a:p>
+            <a:r>
+              <a:rPr lang="en-US" dirty="0" err="1"/>
+              <a:t>Aasdasdasda</a:t>
+            </a:r>
+            <a:endParaRPr lang="en-US" dirty="0"/>
+          </a:p>
+          <a:p>
+            <a:r>
+              <a:rPr lang="en-US" dirty="0" err="1"/>
+              <a:t>asda</a:t>
+            </a:r>
             <a:endParaRPr lang="en-US" dirty="0"/>
           </a:p>
         </p:txBody>

</xml_diff>

<commit_message>
escape characters most of them
</commit_message>
<xml_diff>
--- a/md_ppt/test_results/test.pptx
+++ b/md_ppt/test_results/test.pptx
@@ -5,11 +5,10 @@
     <p:sldMasterId id="2147483648" r:id="rId1"/>
   </p:sldMasterIdLst>
   <p:notesMasterIdLst>
-    <p:notesMasterId r:id="rId4"/>
+    <p:notesMasterId r:id="rId3"/>
   </p:notesMasterIdLst>
   <p:sldIdLst>
     <p:sldId id="256" r:id="rId2"/>
-    <p:sldId id="257" r:id="rId3"/>
   </p:sldIdLst>
   <p:sldSz cx="9144000" cy="5143500" type="screen16x9"/>
   <p:notesSz cx="5143500" cy="9144000"/>
@@ -610,106 +609,12 @@
           <a:chExt cx="0" cy="0"/>
         </a:xfrm>
       </p:grpSpPr>
-      <p:pic>
-        <p:nvPicPr>
-          <p:cNvPr id="1026" name="Picture 2">
+      <p:sp>
+        <p:nvSpPr>
+          <p:cNvPr id="2" name="TextBox 1">
             <a:extLst>
               <a:ext uri="{FF2B5EF4-FFF2-40B4-BE49-F238E27FC236}">
-                <a16:creationId xmlns:a16="http://schemas.microsoft.com/office/drawing/2014/main" id="{7CAB815D-D658-BA81-618F-7AB913C93887}"/>
-              </a:ext>
-            </a:extLst>
-          </p:cNvPr>
-          <p:cNvPicPr>
-            <a:picLocks noChangeAspect="1" noChangeArrowheads="1"/>
-          </p:cNvPicPr>
-          <p:nvPr/>
-        </p:nvPicPr>
-        <p:blipFill>
-          <a:blip r:embed="rId2">
-            <a:extLst>
-              <a:ext uri="{28A0092B-C50C-407E-A947-70E740481C1C}">
-                <a14:useLocalDpi xmlns:a14="http://schemas.microsoft.com/office/drawing/2010/main" val="0"/>
-              </a:ext>
-            </a:extLst>
-          </a:blip>
-          <a:srcRect/>
-          <a:stretch>
-            <a:fillRect/>
-          </a:stretch>
-        </p:blipFill>
-        <p:spPr bwMode="auto">
-          <a:xfrm>
-            <a:off x="571165" y="190500"/>
-            <a:ext cx="3609975" cy="4762500"/>
-          </a:xfrm>
-          <a:prstGeom prst="rect">
-            <a:avLst/>
-          </a:prstGeom>
-          <a:noFill/>
-          <a:extLst>
-            <a:ext uri="{909E8E84-426E-40DD-AFC4-6F175D3DCCD1}">
-              <a14:hiddenFill xmlns:a14="http://schemas.microsoft.com/office/drawing/2010/main">
-                <a:solidFill>
-                  <a:srgbClr val="FFFFFF"/>
-                </a:solidFill>
-              </a14:hiddenFill>
-            </a:ext>
-          </a:extLst>
-        </p:spPr>
-      </p:pic>
-      <p:pic>
-        <p:nvPicPr>
-          <p:cNvPr id="2" name="Picture 2">
-            <a:extLst>
-              <a:ext uri="{FF2B5EF4-FFF2-40B4-BE49-F238E27FC236}">
-                <a16:creationId xmlns:a16="http://schemas.microsoft.com/office/drawing/2014/main" id="{CA331F8E-7741-7839-D6C9-9CAA5C892E29}"/>
-              </a:ext>
-            </a:extLst>
-          </p:cNvPr>
-          <p:cNvPicPr>
-            <a:picLocks noChangeAspect="1" noChangeArrowheads="1"/>
-          </p:cNvPicPr>
-          <p:nvPr/>
-        </p:nvPicPr>
-        <p:blipFill>
-          <a:blip r:embed="rId3">
-            <a:extLst>
-              <a:ext uri="{28A0092B-C50C-407E-A947-70E740481C1C}">
-                <a14:useLocalDpi xmlns:a14="http://schemas.microsoft.com/office/drawing/2010/main" val="0"/>
-              </a:ext>
-            </a:extLst>
-          </a:blip>
-          <a:srcRect/>
-          <a:stretch>
-            <a:fillRect/>
-          </a:stretch>
-        </p:blipFill>
-        <p:spPr bwMode="auto">
-          <a:xfrm>
-            <a:off x="4630186" y="262217"/>
-            <a:ext cx="3560116" cy="4762500"/>
-          </a:xfrm>
-          <a:prstGeom prst="rect">
-            <a:avLst/>
-          </a:prstGeom>
-          <a:noFill/>
-          <a:extLst>
-            <a:ext uri="{909E8E84-426E-40DD-AFC4-6F175D3DCCD1}">
-              <a14:hiddenFill xmlns:a14="http://schemas.microsoft.com/office/drawing/2010/main">
-                <a:solidFill>
-                  <a:srgbClr val="FFFFFF"/>
-                </a:solidFill>
-              </a14:hiddenFill>
-            </a:ext>
-          </a:extLst>
-        </p:spPr>
-      </p:pic>
-      <p:sp>
-        <p:nvSpPr>
-          <p:cNvPr id="3" name="TextBox 2">
-            <a:extLst>
-              <a:ext uri="{FF2B5EF4-FFF2-40B4-BE49-F238E27FC236}">
-                <a16:creationId xmlns:a16="http://schemas.microsoft.com/office/drawing/2014/main" id="{DA7EE8C1-34C3-3BD2-D8A7-B00E17250726}"/>
+                <a16:creationId xmlns:a16="http://schemas.microsoft.com/office/drawing/2014/main" id="{4FC65100-B477-2AC0-3743-BF30034320EC}"/>
               </a:ext>
             </a:extLst>
           </p:cNvPr>
@@ -718,8 +623,8 @@
         </p:nvSpPr>
         <p:spPr>
           <a:xfrm>
-            <a:off x="0" y="220897"/>
-            <a:ext cx="8332631" cy="369332"/>
+            <a:off x="3419061" y="864704"/>
+            <a:ext cx="1421296" cy="923330"/>
           </a:xfrm>
           <a:prstGeom prst="rect">
             <a:avLst/>
@@ -734,7 +639,28 @@
           <a:p>
             <a:r>
               <a:rPr lang="en-US" dirty="0"/>
-              <a:t>WATERCOLORS </a:t>
+              <a:t># palabras</a:t>
+            </a:r>
+          </a:p>
+          <a:p>
+            <a:r>
+              <a:rPr lang="en-US"/>
+              <a:t> </a:t>
+            </a:r>
+            <a:endParaRPr lang="en-US" dirty="0"/>
+          </a:p>
+          <a:p>
+            <a:r>
+              <a:rPr lang="en-US" dirty="0"/>
+              <a:t>‘</a:t>
+            </a:r>
+            <a:r>
+              <a:rPr lang="en-US" dirty="0" err="1"/>
+              <a:t>asd</a:t>
+            </a:r>
+            <a:r>
+              <a:rPr lang="en-US" dirty="0"/>
+              <a:t>’</a:t>
             </a:r>
           </a:p>
         </p:txBody>
@@ -742,84 +668,7 @@
     </p:spTree>
     <p:extLst>
       <p:ext uri="{BB962C8B-B14F-4D97-AF65-F5344CB8AC3E}">
-        <p14:creationId xmlns:p14="http://schemas.microsoft.com/office/powerpoint/2010/main" val="2512424934"/>
-      </p:ext>
-    </p:extLst>
-  </p:cSld>
-  <p:clrMapOvr>
-    <a:masterClrMapping/>
-  </p:clrMapOvr>
-</p:sld>
-</file>
-
-<file path=ppt/slides/slide2.xml><?xml version="1.0" encoding="utf-8"?>
-<p:sld xmlns:a="http://schemas.openxmlformats.org/drawingml/2006/main" xmlns:r="http://schemas.openxmlformats.org/officeDocument/2006/relationships" xmlns:p="http://schemas.openxmlformats.org/presentationml/2006/main">
-  <p:cSld>
-    <p:spTree>
-      <p:nvGrpSpPr>
-        <p:cNvPr id="1" name=""/>
-        <p:cNvGrpSpPr/>
-        <p:nvPr/>
-      </p:nvGrpSpPr>
-      <p:grpSpPr>
-        <a:xfrm>
-          <a:off x="0" y="0"/>
-          <a:ext cx="0" cy="0"/>
-          <a:chOff x="0" y="0"/>
-          <a:chExt cx="0" cy="0"/>
-        </a:xfrm>
-      </p:grpSpPr>
-      <p:pic>
-        <p:nvPicPr>
-          <p:cNvPr id="1026" name="Picture 2">
-            <a:extLst>
-              <a:ext uri="{FF2B5EF4-FFF2-40B4-BE49-F238E27FC236}">
-                <a16:creationId xmlns:a16="http://schemas.microsoft.com/office/drawing/2014/main" id="{7E1A41B8-C942-F37C-CF22-AB1CE889565E}"/>
-              </a:ext>
-            </a:extLst>
-          </p:cNvPr>
-          <p:cNvPicPr>
-            <a:picLocks noChangeAspect="1" noChangeArrowheads="1"/>
-          </p:cNvPicPr>
-          <p:nvPr/>
-        </p:nvPicPr>
-        <p:blipFill>
-          <a:blip r:embed="rId2">
-            <a:extLst>
-              <a:ext uri="{28A0092B-C50C-407E-A947-70E740481C1C}">
-                <a14:useLocalDpi xmlns:a14="http://schemas.microsoft.com/office/drawing/2010/main" val="0"/>
-              </a:ext>
-            </a:extLst>
-          </a:blip>
-          <a:srcRect/>
-          <a:stretch>
-            <a:fillRect/>
-          </a:stretch>
-        </p:blipFill>
-        <p:spPr bwMode="auto">
-          <a:xfrm>
-            <a:off x="2605088" y="0"/>
-            <a:ext cx="3933825" cy="5143500"/>
-          </a:xfrm>
-          <a:prstGeom prst="rect">
-            <a:avLst/>
-          </a:prstGeom>
-          <a:noFill/>
-          <a:extLst>
-            <a:ext uri="{909E8E84-426E-40DD-AFC4-6F175D3DCCD1}">
-              <a14:hiddenFill xmlns:a14="http://schemas.microsoft.com/office/drawing/2010/main">
-                <a:solidFill>
-                  <a:srgbClr val="FFFFFF"/>
-                </a:solidFill>
-              </a14:hiddenFill>
-            </a:ext>
-          </a:extLst>
-        </p:spPr>
-      </p:pic>
-    </p:spTree>
-    <p:extLst>
-      <p:ext uri="{BB962C8B-B14F-4D97-AF65-F5344CB8AC3E}">
-        <p14:creationId xmlns:p14="http://schemas.microsoft.com/office/powerpoint/2010/main" val="111423297"/>
+        <p14:creationId xmlns:p14="http://schemas.microsoft.com/office/powerpoint/2010/main" val="525070052"/>
       </p:ext>
     </p:extLst>
   </p:cSld>

</xml_diff>

<commit_message>
tittle and text functionality done
</commit_message>
<xml_diff>
--- a/md_ppt/test_results/test.pptx
+++ b/md_ppt/test_results/test.pptx
@@ -1,12 +1,14 @@
 
 <file path=ppt/presentation.xml><?xml version="1.0" encoding="utf-8"?>
-<p:presentation xmlns:a="http://schemas.openxmlformats.org/drawingml/2006/main" xmlns:r="http://schemas.openxmlformats.org/officeDocument/2006/relationships" xmlns:p="http://schemas.openxmlformats.org/presentationml/2006/main">
+<p:presentation xmlns:p="http://schemas.openxmlformats.org/presentationml/2006/main">
   <p:sldMasterIdLst>
-    <p:sldMasterId id="2147483648" r:id="rId1"/>
+    <p:sldMasterId xmlns:r="http://schemas.openxmlformats.org/officeDocument/2006/relationships" id="2147483648" r:id="rId1"/>
   </p:sldMasterIdLst>
   <p:sldIdLst>
-    <p:sldId id="256" r:id="rId2"/>
-    <p:sldId id="257" r:id="rId3"/>
+    <p:sldId xmlns:r="http://schemas.openxmlformats.org/officeDocument/2006/relationships" id="256" r:id="rId2"/>
+    <p:sldId xmlns:r="http://schemas.openxmlformats.org/officeDocument/2006/relationships" id="257" r:id="Ra666979ad7864a59"/>
+    <p:sldId xmlns:r="http://schemas.openxmlformats.org/officeDocument/2006/relationships" id="258" r:id="R7088cc757f974a44"/>
+    <p:sldId xmlns:r="http://schemas.openxmlformats.org/officeDocument/2006/relationships" id="259" r:id="R0288fc8732564676"/>
   </p:sldIdLst>
   <p:sldSz cx="9144000" cy="6858000" type="screen4x3"/>
   <p:notesSz cx="6858000" cy="9144000"/>
@@ -15,7 +17,7 @@
 </file>
 
 <file path=ppt/slideLayouts/slideLayout1.xml><?xml version="1.0" encoding="utf-8"?>
-<p:sldLayout xmlns:a="http://schemas.openxmlformats.org/drawingml/2006/main" xmlns:r="http://schemas.openxmlformats.org/officeDocument/2006/relationships" xmlns:p="http://schemas.openxmlformats.org/presentationml/2006/main">
+<p:sldLayout xmlns:p="http://schemas.openxmlformats.org/presentationml/2006/main">
   <p:cSld>
     <p:spTree>
       <p:nvGrpSpPr>
@@ -24,18 +26,13 @@
         <p:nvPr/>
       </p:nvGrpSpPr>
       <p:grpSpPr>
-        <a:xfrm>
-          <a:off x="0" y="0"/>
-          <a:ext cx="0" cy="0"/>
-          <a:chOff x="0" y="0"/>
-          <a:chExt cx="0" cy="0"/>
-        </a:xfrm>
+        <a:xfrm xmlns:a="http://schemas.openxmlformats.org/drawingml/2006/main"/>
       </p:grpSpPr>
       <p:sp>
         <p:nvSpPr>
-          <p:cNvPr id="2" name="Content Placeholder 1"/>
-          <p:cNvSpPr>
-            <a:spLocks noGrp="1"/>
+          <p:cNvPr id="2" name=""/>
+          <p:cNvSpPr>
+            <a:spLocks xmlns:a="http://schemas.openxmlformats.org/drawingml/2006/main" noGrp="1"/>
           </p:cNvSpPr>
           <p:nvPr>
             <p:ph/>
@@ -43,9 +40,9 @@
         </p:nvSpPr>
         <p:spPr/>
         <p:txBody>
-          <a:bodyPr/>
-          <a:lstStyle/>
-          <a:p>
+          <a:bodyPr xmlns:a="http://schemas.openxmlformats.org/drawingml/2006/main"/>
+          <a:lstStyle xmlns:a="http://schemas.openxmlformats.org/drawingml/2006/main"/>
+          <a:p xmlns:a="http://schemas.openxmlformats.org/drawingml/2006/main">
             <a:endParaRPr/>
           </a:p>
         </p:txBody>
@@ -53,19 +50,14 @@
     </p:spTree>
   </p:cSld>
   <p:clrMapOvr>
-    <a:masterClrMapping/>
+    <a:masterClrMapping xmlns:a="http://schemas.openxmlformats.org/drawingml/2006/main"/>
   </p:clrMapOvr>
 </p:sldLayout>
 </file>
 
-<file path=ppt/slideMasters/slideMaster1.xml><?xml version="1.0" encoding="utf-8"?>
-<p:sldMaster xmlns:a="http://schemas.openxmlformats.org/drawingml/2006/main" xmlns:r="http://schemas.openxmlformats.org/officeDocument/2006/relationships" xmlns:p="http://schemas.openxmlformats.org/presentationml/2006/main">
-  <p:cSld>
-    <p:bg>
-      <p:bgRef idx="1001">
-        <a:schemeClr val="bg1"/>
-      </p:bgRef>
-    </p:bg>
+<file path=ppt/slideLayouts/slideMasters/slideMaster1.xml><?xml version="1.0" encoding="utf-8"?>
+<p:sldMaster xmlns:p="http://schemas.openxmlformats.org/presentationml/2006/main">
+  <p:cSld>
     <p:spTree>
       <p:nvGrpSpPr>
         <p:cNvPr id="1" name=""/>
@@ -73,42 +65,35 @@
         <p:nvPr/>
       </p:nvGrpSpPr>
       <p:grpSpPr>
-        <a:xfrm>
-          <a:off x="0" y="0"/>
-          <a:ext cx="0" cy="0"/>
-          <a:chOff x="0" y="0"/>
-          <a:chExt cx="0" cy="0"/>
-        </a:xfrm>
+        <a:xfrm xmlns:a="http://schemas.openxmlformats.org/drawingml/2006/main"/>
       </p:grpSpPr>
       <p:sp>
         <p:nvSpPr>
           <p:cNvPr id="2" name="Title Placeholder 1"/>
           <p:cNvSpPr>
-            <a:spLocks noGrp="1"/>
+            <a:spLocks xmlns:a="http://schemas.openxmlformats.org/drawingml/2006/main" noGrp="1"/>
           </p:cNvSpPr>
           <p:nvPr>
             <p:ph type="title"/>
           </p:nvPr>
         </p:nvSpPr>
         <p:spPr>
-          <a:xfrm>
+          <a:xfrm xmlns:a="http://schemas.openxmlformats.org/drawingml/2006/main">
             <a:off x="0" y="3200000"/>
             <a:ext cx="9144000" cy="457200"/>
           </a:xfrm>
         </p:spPr>
         <p:txBody>
-          <a:bodyPr/>
-          <a:lstStyle/>
-          <a:p>
-            <a:endParaRPr/>
-          </a:p>
+          <a:bodyPr xmlns:a="http://schemas.openxmlformats.org/drawingml/2006/main"/>
+          <a:lstStyle xmlns:a="http://schemas.openxmlformats.org/drawingml/2006/main"/>
+          <a:p xmlns:a="http://schemas.openxmlformats.org/drawingml/2006/main"/>
         </p:txBody>
       </p:sp>
     </p:spTree>
   </p:cSld>
   <p:clrMap bg1="lt1" tx1="dk1" bg2="lt2" tx2="dk2" accent1="accent1" accent2="accent2" accent3="accent3" accent4="accent4" accent5="accent5" accent6="accent6" hlink="hlink" folHlink="folHlink"/>
   <p:sldLayoutIdLst>
-    <p:sldLayoutId id="2147483649" r:id="rId1"/>
+    <p:sldLayoutId xmlns:r="http://schemas.openxmlformats.org/officeDocument/2006/relationships" id="2147483649" r:id="rId1"/>
   </p:sldLayoutIdLst>
   <p:txStyles>
     <p:titleStyle/>
@@ -118,142 +103,7 @@
 </p:sldMaster>
 </file>
 
-<file path=ppt/slides/slide1.xml><?xml version="1.0" encoding="utf-8"?>
-<p:sld xmlns:a="http://schemas.openxmlformats.org/drawingml/2006/main" xmlns:r="http://schemas.openxmlformats.org/officeDocument/2006/relationships" xmlns:p="http://schemas.openxmlformats.org/presentationml/2006/main">
-  <p:cSld>
-    <p:spTree>
-      <p:nvGrpSpPr>
-        <p:cNvPr id="1" name=""/>
-        <p:cNvGrpSpPr/>
-        <p:nvPr/>
-      </p:nvGrpSpPr>
-      <p:grpSpPr>
-        <a:xfrm>
-          <a:off x="0" y="0"/>
-          <a:ext cx="0" cy="0"/>
-          <a:chOff x="0" y="0"/>
-          <a:chExt cx="0" cy="0"/>
-        </a:xfrm>
-      </p:grpSpPr>
-      <p:sp>
-        <p:nvSpPr>
-          <p:cNvPr id="2" name="Title 1"/>
-          <p:cNvSpPr>
-            <a:spLocks noGrp="1"/>
-          </p:cNvSpPr>
-          <p:nvPr>
-            <p:ph/>
-          </p:nvPr>
-        </p:nvSpPr>
-        <p:spPr>
-          <a:xfrm>
-            <a:off x="0" y="3200000"/>
-            <a:ext cx="9144000" cy="457200"/>
-          </a:xfrm>
-        </p:spPr>
-        <p:txBody>
-          <a:bodyPr/>
-          <a:lstStyle/>
-          <a:p>
-            <a:pPr algn="ctr"/>
-            <a:r>
-              <a:rPr lang="en-US" sz="2200" dirty="0"/>
-              <a:t>Presentacion </a:t>
-            </a:r>
-            <a:endParaRPr lang="en-US"/>
-          </a:p>
-        </p:txBody>
-      </p:sp>
-    </p:spTree>
-  </p:cSld>
-  <p:clrMapOvr>
-    <a:masterClrMapping/>
-  </p:clrMapOvr>
-</p:sld>
-</file>
-
-<file path=ppt/slides/slide2.xml><?xml version="1.0" encoding="utf-8"?>
-<p:sld xmlns:a="http://schemas.openxmlformats.org/drawingml/2006/main" xmlns:r="http://schemas.openxmlformats.org/officeDocument/2006/relationships" xmlns:p="http://schemas.openxmlformats.org/presentationml/2006/main">
-  <p:cSld>
-    <p:spTree>
-      <p:nvGrpSpPr>
-        <p:cNvPr id="1" name=""/>
-        <p:cNvGrpSpPr/>
-        <p:nvPr/>
-      </p:nvGrpSpPr>
-      <p:grpSpPr>
-        <a:xfrm>
-          <a:off x="0" y="0"/>
-          <a:ext cx="0" cy="0"/>
-          <a:chOff x="0" y="0"/>
-          <a:chExt cx="0" cy="0"/>
-        </a:xfrm>
-      </p:grpSpPr>
-      <p:sp>
-        <p:nvSpPr>
-          <p:cNvPr id="2" name="Title"/>
-          <p:cNvSpPr>
-            <a:spLocks noGrp="1"/>
-          </p:cNvSpPr>
-          <p:nvPr>
-            <p:ph type="title"/>
-          </p:nvPr>
-        </p:nvSpPr>
-        <p:spPr>
-          <a:xfrm>
-            <a:off x="0" y="1900000"/>
-            <a:ext cx="9144000" cy="557200"/>
-          </a:xfrm>
-        </p:spPr>
-        <p:txBody>
-          <a:bodyPr/>
-          <a:lstStyle/>
-          <a:p>
-            <a:pPr algn="ctr"/>
-            <a:r>
-              <a:rPr lang="en-US" sz="6500" dirty="0"/>
-              <a:t>TEXTO inicio</a:t>
-            </a:r>
-          </a:p>
-        </p:txBody>
-      </p:sp>
-      <p:sp>
-        <p:nvSpPr>
-          <p:cNvPr id="3" name="Title"/>
-          <p:cNvSpPr>
-            <a:spLocks noGrp="1"/>
-          </p:cNvSpPr>
-          <p:nvPr>
-            <p:ph type="title"/>
-          </p:nvPr>
-        </p:nvSpPr>
-        <p:spPr>
-          <a:xfrm>
-            <a:off x="0" y="2900000"/>
-            <a:ext cx="9144000" cy="557200"/>
-          </a:xfrm>
-        </p:spPr>
-        <p:txBody>
-          <a:bodyPr/>
-          <a:lstStyle/>
-          <a:p>
-            <a:pPr algn="ctr"/>
-            <a:r>
-              <a:rPr lang="en-US" sz="5500" dirty="0"/>
-              <a:t>TEXTO</a:t>
-            </a:r>
-          </a:p>
-        </p:txBody>
-      </p:sp>
-    </p:spTree>
-  </p:cSld>
-  <p:clrMapOvr>
-    <a:masterClrMapping/>
-  </p:clrMapOvr>
-</p:sld>
-</file>
-
-<file path=ppt/theme/theme1.xml><?xml version="1.0" encoding="utf-8"?>
+<file path=ppt/slideLayouts/slideMasters/theme/theme1.xml><?xml version="1.0" encoding="utf-8"?>
 <a:theme xmlns:a="http://schemas.openxmlformats.org/drawingml/2006/main" name="Office Theme">
   <a:themeElements>
     <a:clrScheme name="Office">
@@ -446,4 +296,183 @@
   <a:objectDefaults/>
   <a:extraClrSchemeLst/>
 </a:theme>
+</file>
+
+<file path=ppt/slides/slide1.xml><?xml version="1.0" encoding="utf-8"?>
+<p:sld xmlns:p="http://schemas.openxmlformats.org/presentationml/2006/main">
+  <p:cSld>
+    <p:spTree>
+      <p:nvGrpSpPr>
+        <p:cNvPr id="1" name=""/>
+        <p:cNvGrpSpPr/>
+        <p:nvPr/>
+      </p:nvGrpSpPr>
+      <p:grpSpPr>
+        <a:xfrm xmlns:a="http://schemas.openxmlformats.org/drawingml/2006/main"/>
+      </p:grpSpPr>
+      <p:sp>
+        <p:nvSpPr>
+          <p:cNvPr id="2" name="Title 1"/>
+          <p:cNvSpPr>
+            <a:spLocks xmlns:a="http://schemas.openxmlformats.org/drawingml/2006/main" noGrp="1"/>
+          </p:cNvSpPr>
+          <p:nvPr>
+            <p:ph/>
+          </p:nvPr>
+        </p:nvSpPr>
+        <p:spPr>
+          <a:xfrm xmlns:a="http://schemas.openxmlformats.org/drawingml/2006/main">
+            <a:off x="0" y="3200000"/>
+            <a:ext cx="9144000" cy="457200"/>
+          </a:xfrm>
+        </p:spPr>
+        <p:txBody>
+          <a:bodyPr xmlns:a="http://schemas.openxmlformats.org/drawingml/2006/main"/>
+          <a:lstStyle xmlns:a="http://schemas.openxmlformats.org/drawingml/2006/main"/>
+          <a:p xmlns:a="http://schemas.openxmlformats.org/drawingml/2006/main">
+            <a:pPr algn="ctr"/>
+            <a:r>
+              <a:rPr lang="en-US" sz="2200" dirty="0" err="0"/>
+              <a:t>Presentacion </a:t>
+            </a:r>
+            <a:endParaRPr lang="en-US"/>
+          </a:p>
+        </p:txBody>
+      </p:sp>
+    </p:spTree>
+  </p:cSld>
+  <p:clrMapOvr>
+    <a:masterClrMapping xmlns:a="http://schemas.openxmlformats.org/drawingml/2006/main"/>
+  </p:clrMapOvr>
+</p:sld>
+</file>
+
+<file path=ppt/slides/slide2.xml><?xml version="1.0" encoding="utf-8"?>
+<p:sld xmlns:p="http://schemas.openxmlformats.org/presentationml/2006/main">
+  <p:cSld>
+    <p:spTree>
+      <p:nvGrpSpPr>
+        <p:cNvPr id="1" name=""/>
+        <p:cNvGrpSpPr/>
+        <p:nvPr/>
+      </p:nvGrpSpPr>
+      <p:grpSpPr/>
+      <p:sp>
+        <p:nvSpPr>
+          <p:cNvPr id="1" name="Title"/>
+          <p:cNvSpPr>
+            <a:spLocks xmlns:a="http://schemas.openxmlformats.org/drawingml/2006/main" noGrp="1"/>
+          </p:cNvSpPr>
+          <p:nvPr>
+            <p:ph type="title"/>
+          </p:nvPr>
+        </p:nvSpPr>
+        <p:spPr>
+          <a:xfrm xmlns:a="http://schemas.openxmlformats.org/drawingml/2006/main">
+            <a:off x="0" y="1000000"/>
+            <a:ext cx="9144000" cy="557200"/>
+          </a:xfrm>
+        </p:spPr>
+        <p:txBody>
+          <a:bodyPr xmlns:a="http://schemas.openxmlformats.org/drawingml/2006/main"/>
+          <a:lstStyle xmlns:a="http://schemas.openxmlformats.org/drawingml/2006/main"/>
+          <a:p xmlns:a="http://schemas.openxmlformats.org/drawingml/2006/main">
+            <a:pPr algn="ctr"/>
+            <a:r>
+              <a:rPr lang="en-US" sz="6500" dirty="0" err="0"/>
+              <a:t>TEXTO inicio</a:t>
+            </a:r>
+          </a:p>
+        </p:txBody>
+      </p:sp>
+    </p:spTree>
+  </p:cSld>
+</p:sld>
+</file>
+
+<file path=ppt/slides/slide3.xml><?xml version="1.0" encoding="utf-8"?>
+<p:sld xmlns:p="http://schemas.openxmlformats.org/presentationml/2006/main">
+  <p:cSld>
+    <p:spTree>
+      <p:nvGrpSpPr>
+        <p:cNvPr id="1" name=""/>
+        <p:cNvGrpSpPr/>
+        <p:nvPr/>
+      </p:nvGrpSpPr>
+      <p:grpSpPr/>
+      <p:sp>
+        <p:nvSpPr>
+          <p:cNvPr id="1" name="Title"/>
+          <p:cNvSpPr>
+            <a:spLocks xmlns:a="http://schemas.openxmlformats.org/drawingml/2006/main" noGrp="1"/>
+          </p:cNvSpPr>
+          <p:nvPr>
+            <p:ph type="title"/>
+          </p:nvPr>
+        </p:nvSpPr>
+        <p:spPr>
+          <a:xfrm xmlns:a="http://schemas.openxmlformats.org/drawingml/2006/main">
+            <a:off x="0" y="1000000"/>
+            <a:ext cx="9144000" cy="557200"/>
+          </a:xfrm>
+        </p:spPr>
+        <p:txBody>
+          <a:bodyPr xmlns:a="http://schemas.openxmlformats.org/drawingml/2006/main"/>
+          <a:lstStyle xmlns:a="http://schemas.openxmlformats.org/drawingml/2006/main"/>
+          <a:p xmlns:a="http://schemas.openxmlformats.org/drawingml/2006/main">
+            <a:pPr algn="ctr"/>
+            <a:r>
+              <a:rPr lang="en-US" sz="5500" dirty="0" err="0"/>
+              <a:t>TEXTO</a:t>
+            </a:r>
+          </a:p>
+        </p:txBody>
+      </p:sp>
+    </p:spTree>
+  </p:cSld>
+</p:sld>
+</file>
+
+<file path=ppt/slides/slide4.xml><?xml version="1.0" encoding="utf-8"?>
+<p:sld xmlns:p="http://schemas.openxmlformats.org/presentationml/2006/main">
+  <p:cSld>
+    <p:spTree>
+      <p:nvGrpSpPr>
+        <p:cNvPr id="1" name=""/>
+        <p:cNvGrpSpPr/>
+        <p:nvPr/>
+      </p:nvGrpSpPr>
+      <p:grpSpPr/>
+      <p:sp>
+        <p:nvSpPr>
+          <p:cNvPr id="1" name="Content Placeholder"/>
+          <p:cNvSpPr>
+            <a:spLocks xmlns:a="http://schemas.openxmlformats.org/drawingml/2006/main" noGrp="1"/>
+          </p:cNvSpPr>
+          <p:nvPr>
+            <p:ph idx="1"/>
+          </p:nvPr>
+        </p:nvSpPr>
+        <p:spPr>
+          <a:xfrm xmlns:a="http://schemas.openxmlformats.org/drawingml/2006/main">
+            <a:off x="0" y="1000000"/>
+            <a:ext cx="9144000" cy="457200"/>
+          </a:xfrm>
+        </p:spPr>
+        <p:txBody>
+          <a:bodyPr xmlns:a="http://schemas.openxmlformats.org/drawingml/2006/main"/>
+          <a:lstStyle xmlns:a="http://schemas.openxmlformats.org/drawingml/2006/main"/>
+          <a:p xmlns:a="http://schemas.openxmlformats.org/drawingml/2006/main">
+            <a:pPr algn="ctr"/>
+            <a:r>
+              <a:rPr lang="en-US" sz="1800" dirty="0" err="0"/>
+              <a:t>HA GOT 1
+HA GOT 2</a:t>
+            </a:r>
+          </a:p>
+        </p:txBody>
+      </p:sp>
+    </p:spTree>
+  </p:cSld>
+</p:sld>
 </file>
</xml_diff>

<commit_message>
blockquotes and codeblocks ready
</commit_message>
<xml_diff>
--- a/md_ppt/test_results/test.pptx
+++ b/md_ppt/test_results/test.pptx
@@ -6,7 +6,8 @@
   </p:sldMasterIdLst>
   <p:sldIdLst>
     <p:sldId xmlns:r="http://schemas.openxmlformats.org/officeDocument/2006/relationships" id="256" r:id="rId2"/>
-    <p:sldId xmlns:r="http://schemas.openxmlformats.org/officeDocument/2006/relationships" id="257" r:id="Rb9692f2a735c49d8"/>
+    <p:sldId xmlns:r="http://schemas.openxmlformats.org/officeDocument/2006/relationships" id="257" r:id="Rc090e769307d4e6a"/>
+    <p:sldId xmlns:r="http://schemas.openxmlformats.org/officeDocument/2006/relationships" id="258" r:id="R215e95f7986f48cb"/>
   </p:sldIdLst>
   <p:sldSz cx="9144000" cy="6858000" type="screen4x3"/>
   <p:notesSz cx="6858000" cy="9144000"/>
@@ -94,9 +95,266 @@
     <p:sldLayoutId xmlns:r="http://schemas.openxmlformats.org/officeDocument/2006/relationships" id="2147483649" r:id="rId1"/>
   </p:sldLayoutIdLst>
   <p:txStyles>
-    <p:titleStyle/>
-    <p:bodyStyle/>
-    <p:otherStyle/>
+    <p:titleStyle xmlns:p="http://schemas.openxmlformats.org/presentationml/2006/main">
+      <a:lvl1pPr xmlns:a="http://schemas.openxmlformats.org/drawingml/2006/main" algn="l" defTabSz="914400" rtl="0" eaLnBrk="1" latinLnBrk="0" hangingPunct="1">
+        <a:lnSpc>
+          <a:spcPct val="90000"/>
+        </a:lnSpc>
+        <a:spcBef>
+          <a:spcPct val="0"/>
+        </a:spcBef>
+        <a:buNone/>
+        <a:defRPr sz="4400" kern="1200">
+          <a:solidFill>
+            <a:schemeClr val="tx1"/>
+          </a:solidFill>
+          <a:latin typeface="+mj-lt"/>
+          <a:ea typeface="+mj-ea"/>
+          <a:cs typeface="+mj-cs"/>
+        </a:defRPr>
+      </a:lvl1pPr>
+    </p:titleStyle>
+    <p:bodyStyle xmlns:p="http://schemas.openxmlformats.org/presentationml/2006/main">
+      <a:lvl1pPr xmlns:a="http://schemas.openxmlformats.org/drawingml/2006/main" marL="228600" indent="-228600" algn="l" defTabSz="914400" rtl="0" eaLnBrk="1" latinLnBrk="0" hangingPunct="1">
+        <a:lnSpc>
+          <a:spcPct val="90000"/>
+        </a:lnSpc>
+        <a:spcBef>
+          <a:spcPts val="1000"/>
+        </a:spcBef>
+        <a:defRPr sz="2800" kern="1200">
+          <a:solidFill>
+            <a:schemeClr val="tx1"/>
+          </a:solidFill>
+          <a:latin typeface="+mn-lt"/>
+          <a:ea typeface="+mn-ea"/>
+          <a:cs typeface="+mn-cs"/>
+        </a:defRPr>
+      </a:lvl1pPr>
+      <a:lvl2pPr xmlns:a="http://schemas.openxmlformats.org/drawingml/2006/main" marL="685800" indent="-228600" algn="l" defTabSz="914400" rtl="0" eaLnBrk="1" latinLnBrk="0" hangingPunct="1">
+        <a:lnSpc>
+          <a:spcPct val="90000"/>
+        </a:lnSpc>
+        <a:spcBef>
+          <a:spcPts val="500"/>
+        </a:spcBef>
+        <a:defRPr sz="2400" kern="1200">
+          <a:solidFill>
+            <a:schemeClr val="tx1"/>
+          </a:solidFill>
+          <a:latin typeface="+mn-lt"/>
+          <a:ea typeface="+mn-ea"/>
+          <a:cs typeface="+mn-cs"/>
+        </a:defRPr>
+      </a:lvl2pPr>
+      <a:lvl3pPr xmlns:a="http://schemas.openxmlformats.org/drawingml/2006/main" marL="1143000" indent="-228600" algn="l" defTabSz="914400" rtl="0" eaLnBrk="1" latinLnBrk="0" hangingPunct="1">
+        <a:lnSpc>
+          <a:spcPct val="90000"/>
+        </a:lnSpc>
+        <a:spcBef>
+          <a:spcPts val="500"/>
+        </a:spcBef>
+        <a:defRPr sz="2000" kern="1200">
+          <a:solidFill>
+            <a:schemeClr val="tx1"/>
+          </a:solidFill>
+          <a:latin typeface="+mn-lt"/>
+          <a:ea typeface="+mn-ea"/>
+          <a:cs typeface="+mn-cs"/>
+        </a:defRPr>
+      </a:lvl3pPr>
+      <a:lvl4pPr xmlns:a="http://schemas.openxmlformats.org/drawingml/2006/main" marL="1600200" indent="-228600" algn="l" defTabSz="914400" rtl="0" eaLnBrk="1" latinLnBrk="0" hangingPunct="1">
+        <a:lnSpc>
+          <a:spcPct val="90000"/>
+        </a:lnSpc>
+        <a:spcBef>
+          <a:spcPts val="500"/>
+        </a:spcBef>
+        <a:defRPr sz="1800" kern="1200">
+          <a:solidFill>
+            <a:schemeClr val="tx1"/>
+          </a:solidFill>
+          <a:latin typeface="+mn-lt"/>
+          <a:ea typeface="+mn-ea"/>
+          <a:cs typeface="+mn-cs"/>
+        </a:defRPr>
+      </a:lvl4pPr>
+      <a:lvl5pPr xmlns:a="http://schemas.openxmlformats.org/drawingml/2006/main" marL="2057400" indent="-228600" algn="l" defTabSz="914400" rtl="0" eaLnBrk="1" latinLnBrk="0" hangingPunct="1">
+        <a:lnSpc>
+          <a:spcPct val="90000"/>
+        </a:lnSpc>
+        <a:spcBef>
+          <a:spcPts val="500"/>
+        </a:spcBef>
+        <a:defRPr sz="1800" kern="1200">
+          <a:solidFill>
+            <a:schemeClr val="tx1"/>
+          </a:solidFill>
+          <a:latin typeface="+mn-lt"/>
+          <a:ea typeface="+mn-ea"/>
+          <a:cs typeface="+mn-cs"/>
+        </a:defRPr>
+      </a:lvl5pPr>
+      <a:lvl6pPr xmlns:a="http://schemas.openxmlformats.org/drawingml/2006/main" marL="2514600" indent="-228600" algn="l" defTabSz="914400" rtl="0" eaLnBrk="1" latinLnBrk="0" hangingPunct="1">
+        <a:lnSpc>
+          <a:spcPct val="90000"/>
+        </a:lnSpc>
+        <a:spcBef>
+          <a:spcPts val="500"/>
+        </a:spcBef>
+        <a:defRPr sz="1800" kern="1200">
+          <a:solidFill>
+            <a:schemeClr val="tx1"/>
+          </a:solidFill>
+          <a:latin typeface="+mn-lt"/>
+          <a:ea typeface="+mn-ea"/>
+          <a:cs typeface="+mn-cs"/>
+        </a:defRPr>
+      </a:lvl6pPr>
+      <a:lvl7pPr xmlns:a="http://schemas.openxmlformats.org/drawingml/2006/main" marL="2971800" indent="-228600" algn="l" defTabSz="914400" rtl="0" eaLnBrk="1" latinLnBrk="0" hangingPunct="1">
+        <a:lnSpc>
+          <a:spcPct val="90000"/>
+        </a:lnSpc>
+        <a:spcBef>
+          <a:spcPts val="500"/>
+        </a:spcBef>
+        <a:defRPr sz="1800" kern="1200">
+          <a:solidFill>
+            <a:schemeClr val="tx1"/>
+          </a:solidFill>
+          <a:latin typeface="+mn-lt"/>
+          <a:ea typeface="+mn-ea"/>
+          <a:cs typeface="+mn-cs"/>
+        </a:defRPr>
+      </a:lvl7pPr>
+      <a:lvl8pPr xmlns:a="http://schemas.openxmlformats.org/drawingml/2006/main" marL="3429000" indent="-228600" algn="l" defTabSz="914400" rtl="0" eaLnBrk="1" latinLnBrk="0" hangingPunct="1">
+        <a:lnSpc>
+          <a:spcPct val="90000"/>
+        </a:lnSpc>
+        <a:spcBef>
+          <a:spcPts val="500"/>
+        </a:spcBef>
+        <a:defRPr sz="1800" kern="1200">
+          <a:solidFill>
+            <a:schemeClr val="tx1"/>
+          </a:solidFill>
+          <a:latin typeface="+mn-lt"/>
+          <a:ea typeface="+mn-ea"/>
+          <a:cs typeface="+mn-cs"/>
+        </a:defRPr>
+      </a:lvl8pPr>
+      <a:lvl9pPr xmlns:a="http://schemas.openxmlformats.org/drawingml/2006/main" marL="3886200" indent="-228600" algn="l" defTabSz="914400" rtl="0" eaLnBrk="1" latinLnBrk="0" hangingPunct="1">
+        <a:lnSpc>
+          <a:spcPct val="90000"/>
+        </a:lnSpc>
+        <a:spcBef>
+          <a:spcPts val="500"/>
+        </a:spcBef>
+        <a:defRPr sz="1800" kern="1200">
+          <a:solidFill>
+            <a:schemeClr val="tx1"/>
+          </a:solidFill>
+          <a:latin typeface="+mn-lt"/>
+          <a:ea typeface="+mn-ea"/>
+          <a:cs typeface="+mn-cs"/>
+        </a:defRPr>
+      </a:lvl9pPr>
+    </p:bodyStyle>
+    <p:otherStyle xmlns:p="http://schemas.openxmlformats.org/presentationml/2006/main">
+      <a:defPPr xmlns:a="http://schemas.openxmlformats.org/drawingml/2006/main">
+        <a:defRPr lang="en-US"/>
+      </a:defPPr>
+      <a:lvl1pPr xmlns:a="http://schemas.openxmlformats.org/drawingml/2006/main" marL="0" algn="l" defTabSz="914400" rtl="0" eaLnBrk="1" latinLnBrk="0" hangingPunct="1">
+        <a:defRPr sz="1800" kern="1200">
+          <a:solidFill>
+            <a:schemeClr val="tx1"/>
+          </a:solidFill>
+          <a:latin typeface="+mn-lt"/>
+          <a:ea typeface="+mn-ea"/>
+          <a:cs typeface="+mn-cs"/>
+        </a:defRPr>
+      </a:lvl1pPr>
+      <a:lvl2pPr xmlns:a="http://schemas.openxmlformats.org/drawingml/2006/main" marL="457200" algn="l" defTabSz="914400" rtl="0" eaLnBrk="1" latinLnBrk="0" hangingPunct="1">
+        <a:defRPr sz="1800" kern="1200">
+          <a:solidFill>
+            <a:schemeClr val="tx1"/>
+          </a:solidFill>
+          <a:latin typeface="+mn-lt"/>
+          <a:ea typeface="+mn-ea"/>
+          <a:cs typeface="+mn-cs"/>
+        </a:defRPr>
+      </a:lvl2pPr>
+      <a:lvl3pPr xmlns:a="http://schemas.openxmlformats.org/drawingml/2006/main" marL="914400" algn="l" defTabSz="914400" rtl="0" eaLnBrk="1" latinLnBrk="0" hangingPunct="1">
+        <a:defRPr sz="1800" kern="1200">
+          <a:solidFill>
+            <a:schemeClr val="tx1"/>
+          </a:solidFill>
+          <a:latin typeface="+mn-lt"/>
+          <a:ea typeface="+mn-ea"/>
+          <a:cs typeface="+mn-cs"/>
+        </a:defRPr>
+      </a:lvl3pPr>
+      <a:lvl4pPr xmlns:a="http://schemas.openxmlformats.org/drawingml/2006/main" marL="1371600" algn="l" defTabSz="914400" rtl="0" eaLnBrk="1" latinLnBrk="0" hangingPunct="1">
+        <a:defRPr sz="1800" kern="1200">
+          <a:solidFill>
+            <a:schemeClr val="tx1"/>
+          </a:solidFill>
+          <a:latin typeface="+mn-lt"/>
+          <a:ea typeface="+mn-ea"/>
+          <a:cs typeface="+mn-cs"/>
+        </a:defRPr>
+      </a:lvl4pPr>
+      <a:lvl5pPr xmlns:a="http://schemas.openxmlformats.org/drawingml/2006/main" marL="1828800" algn="l" defTabSz="914400" rtl="0" eaLnBrk="1" latinLnBrk="0" hangingPunct="1">
+        <a:defRPr sz="1800" kern="1200">
+          <a:solidFill>
+            <a:schemeClr val="tx1"/>
+          </a:solidFill>
+          <a:latin typeface="+mn-lt"/>
+          <a:ea typeface="+mn-ea"/>
+          <a:cs typeface="+mn-cs"/>
+        </a:defRPr>
+      </a:lvl5pPr>
+      <a:lvl6pPr xmlns:a="http://schemas.openxmlformats.org/drawingml/2006/main" marL="2286000" algn="l" defTabSz="914400" rtl="0" eaLnBrk="1" latinLnBrk="0" hangingPunct="1">
+        <a:defRPr sz="1800" kern="1200">
+          <a:solidFill>
+            <a:schemeClr val="tx1"/>
+          </a:solidFill>
+          <a:latin typeface="+mn-lt"/>
+          <a:ea typeface="+mn-ea"/>
+          <a:cs typeface="+mn-cs"/>
+        </a:defRPr>
+      </a:lvl6pPr>
+      <a:lvl7pPr xmlns:a="http://schemas.openxmlformats.org/drawingml/2006/main" marL="2743200" algn="l" defTabSz="914400" rtl="0" eaLnBrk="1" latinLnBrk="0" hangingPunct="1">
+        <a:defRPr sz="1800" kern="1200">
+          <a:solidFill>
+            <a:schemeClr val="tx1"/>
+          </a:solidFill>
+          <a:latin typeface="+mn-lt"/>
+          <a:ea typeface="+mn-ea"/>
+          <a:cs typeface="+mn-cs"/>
+        </a:defRPr>
+      </a:lvl7pPr>
+      <a:lvl8pPr xmlns:a="http://schemas.openxmlformats.org/drawingml/2006/main" marL="3200400" algn="l" defTabSz="914400" rtl="0" eaLnBrk="1" latinLnBrk="0" hangingPunct="1">
+        <a:defRPr sz="1800" kern="1200">
+          <a:solidFill>
+            <a:schemeClr val="tx1"/>
+          </a:solidFill>
+          <a:latin typeface="+mn-lt"/>
+          <a:ea typeface="+mn-ea"/>
+          <a:cs typeface="+mn-cs"/>
+        </a:defRPr>
+      </a:lvl8pPr>
+      <a:lvl9pPr xmlns:a="http://schemas.openxmlformats.org/drawingml/2006/main" marL="3657600" algn="l" defTabSz="914400" rtl="0" eaLnBrk="1" latinLnBrk="0" hangingPunct="1">
+        <a:defRPr sz="1800" kern="1200">
+          <a:solidFill>
+            <a:schemeClr val="tx1"/>
+          </a:solidFill>
+          <a:latin typeface="+mn-lt"/>
+          <a:ea typeface="+mn-ea"/>
+          <a:cs typeface="+mn-cs"/>
+        </a:defRPr>
+      </a:lvl9pPr>
+    </p:otherStyle>
   </p:txStyles>
 </p:sldMaster>
 </file>
@@ -357,6 +615,49 @@
       <p:grpSpPr/>
       <p:sp>
         <p:nvSpPr>
+          <p:cNvPr id="1" name="Title"/>
+          <p:cNvSpPr>
+            <a:spLocks xmlns:a="http://schemas.openxmlformats.org/drawingml/2006/main" noGrp="1"/>
+          </p:cNvSpPr>
+          <p:nvPr>
+            <p:ph type="title"/>
+          </p:nvPr>
+        </p:nvSpPr>
+        <p:spPr>
+          <a:xfrm xmlns:a="http://schemas.openxmlformats.org/drawingml/2006/main">
+            <a:off x="0" y="1000000"/>
+            <a:ext cx="9144000" cy="557200"/>
+          </a:xfrm>
+        </p:spPr>
+        <p:txBody>
+          <a:bodyPr xmlns:a="http://schemas.openxmlformats.org/drawingml/2006/main"/>
+          <a:lstStyle xmlns:a="http://schemas.openxmlformats.org/drawingml/2006/main"/>
+          <a:p xmlns:a="http://schemas.openxmlformats.org/drawingml/2006/main">
+            <a:pPr algn="ctr"/>
+            <a:r>
+              <a:rPr lang="en-US" sz="6500" dirty="0" err="0"/>
+              <a:t>TITTLE</a:t>
+            </a:r>
+          </a:p>
+        </p:txBody>
+      </p:sp>
+    </p:spTree>
+  </p:cSld>
+</p:sld>
+</file>
+
+<file path=ppt/slides/slide3.xml><?xml version="1.0" encoding="utf-8"?>
+<p:sld xmlns:p="http://schemas.openxmlformats.org/presentationml/2006/main">
+  <p:cSld>
+    <p:spTree>
+      <p:nvGrpSpPr>
+        <p:cNvPr id="1" name=""/>
+        <p:cNvGrpSpPr/>
+        <p:nvPr/>
+      </p:nvGrpSpPr>
+      <p:grpSpPr/>
+      <p:sp>
+        <p:nvSpPr>
           <p:cNvPr id="1" name="Content Placeholder"/>
           <p:cNvSpPr>
             <a:spLocks xmlns:a="http://schemas.openxmlformats.org/drawingml/2006/main" noGrp="1"/>
@@ -367,28 +668,28 @@
         </p:nvSpPr>
         <p:spPr>
           <a:xfrm xmlns:a="http://schemas.openxmlformats.org/drawingml/2006/main">
-            <a:off x="0" y="1000000"/>
+            <a:off x="500000" y="1000000"/>
             <a:ext cx="8144000" cy="923330"/>
           </a:xfrm>
           <a:prstGeom xmlns:a="http://schemas.openxmlformats.org/drawingml/2006/main" prst="rect">
             <a:avLst/>
           </a:prstGeom>
-          <a:solidFill xmlns:a="http://schemas.openxmlformats.org/drawingml/2006/main">
-            <a:schemeClr val="bg1">
-              <a:lumMod val="10000"/>
-            </a:schemeClr>
-          </a:solidFill>
         </p:spPr>
         <p:txBody>
-          <a:bodyPr xmlns:a="http://schemas.openxmlformats.org/drawingml/2006/main" wrap="square"/>
+          <a:bodyPr xmlns:a="http://schemas.openxmlformats.org/drawingml/2006/main" wrap="square" rtlCol="0">
+            <a:spAutoFit/>
+          </a:bodyPr>
           <a:lstStyle xmlns:a="http://schemas.openxmlformats.org/drawingml/2006/main"/>
           <a:p xmlns:a="http://schemas.openxmlformats.org/drawingml/2006/main">
-            <a:pPr algn="l"/>
+            <a:pPr lvl="1"/>
             <a:r>
               <a:rPr lang="en-US" sz="1800" dirty="0" err="0"/>
-              <a:t>	A lotta text
+              <a:t>
+boid	
+bead
 </a:t>
             </a:r>
+            <a:endParaRPr/>
           </a:p>
         </p:txBody>
       </p:sp>

</xml_diff>

<commit_message>
Italics and bold done
</commit_message>
<xml_diff>
--- a/md_ppt/test_results/test.pptx
+++ b/md_ppt/test_results/test.pptx
@@ -6,7 +6,7 @@
   </p:sldMasterIdLst>
   <p:sldIdLst>
     <p:sldId xmlns:r="http://schemas.openxmlformats.org/officeDocument/2006/relationships" id="256" r:id="rId2"/>
-    <p:sldId xmlns:r="http://schemas.openxmlformats.org/officeDocument/2006/relationships" id="257" r:id="R4a695fe62f56422f"/>
+    <p:sldId xmlns:r="http://schemas.openxmlformats.org/officeDocument/2006/relationships" id="257" r:id="R428d70b97f74436b"/>
   </p:sldIdLst>
   <p:sldSz cx="9144000" cy="6858000" type="screen4x3"/>
   <p:notesSz cx="6858000" cy="9144000"/>
@@ -645,20 +645,20 @@
               <a:rPr lang="en-US" sz="1800" dirty="0" err="0"/>
               <a:t> bold but don't go to far</a:t>
             </a:r>
-            <a:r>
-              <a:rPr lang="en-US" sz="1800" dirty="0" err="0"/>
-              <a:t>the ice cream man appear on a van</a:t>
-            </a:r>
           </a:p>
           <a:p xmlns:a="http://schemas.openxmlformats.org/drawingml/2006/main">
             <a:pPr algn="ctr"/>
             <a:r>
               <a:rPr lang="en-US" sz="1800" dirty="0" err="0"/>
-              <a:t>with </a:t>
+              <a:t>the ice cream man appear on a van</a:t>
             </a:r>
           </a:p>
           <a:p xmlns:a="http://schemas.openxmlformats.org/drawingml/2006/main">
             <a:pPr algn="ctr"/>
+            <a:r>
+              <a:rPr lang="en-US" sz="1800" dirty="0" err="0"/>
+              <a:t>with </a:t>
+            </a:r>
             <a:r>
               <a:rPr lang="en-US" sz="1800" i="1" dirty="0"/>
               <a:t>all</a:t>

</xml_diff>